<commit_message>
setting up python example
</commit_message>
<xml_diff>
--- a/session-1/Session 1 - KLC Introduction.pptx
+++ b/session-1/Session 1 - KLC Introduction.pptx
@@ -5,13 +5,14 @@
     <p:sldMasterId id="2147483654" r:id="rId1"/>
   </p:sldMasterIdLst>
   <p:notesMasterIdLst>
-    <p:notesMasterId r:id="rId6"/>
+    <p:notesMasterId r:id="rId7"/>
   </p:notesMasterIdLst>
   <p:sldIdLst>
     <p:sldId id="256" r:id="rId2"/>
     <p:sldId id="320" r:id="rId3"/>
-    <p:sldId id="321" r:id="rId4"/>
+    <p:sldId id="322" r:id="rId4"/>
     <p:sldId id="285" r:id="rId5"/>
+    <p:sldId id="321" r:id="rId6"/>
   </p:sldIdLst>
   <p:sldSz cx="9144000" cy="6858000" type="screen4x3"/>
   <p:notesSz cx="7010400" cy="9236075"/>
@@ -9220,6 +9221,542 @@
           <p:cNvPr id="2" name="Title 1">
             <a:extLst>
               <a:ext uri="{FF2B5EF4-FFF2-40B4-BE49-F238E27FC236}">
+                <a16:creationId xmlns:a16="http://schemas.microsoft.com/office/drawing/2014/main" id="{025454DD-6039-10CC-CCF9-C1171B6D7831}"/>
+              </a:ext>
+            </a:extLst>
+          </p:cNvPr>
+          <p:cNvSpPr>
+            <a:spLocks noGrp="1"/>
+          </p:cNvSpPr>
+          <p:nvPr>
+            <p:ph type="title"/>
+          </p:nvPr>
+        </p:nvSpPr>
+        <p:spPr/>
+        <p:txBody>
+          <a:bodyPr/>
+          <a:lstStyle/>
+          <a:p>
+            <a:r>
+              <a:rPr lang="en-US" dirty="0"/>
+              <a:t>Graphical Programming Tools</a:t>
+            </a:r>
+          </a:p>
+        </p:txBody>
+      </p:sp>
+      <p:sp>
+        <p:nvSpPr>
+          <p:cNvPr id="3" name="Text Placeholder 2">
+            <a:extLst>
+              <a:ext uri="{FF2B5EF4-FFF2-40B4-BE49-F238E27FC236}">
+                <a16:creationId xmlns:a16="http://schemas.microsoft.com/office/drawing/2014/main" id="{2FC87053-41F3-5A70-3F8C-0FE99D84D76E}"/>
+              </a:ext>
+            </a:extLst>
+          </p:cNvPr>
+          <p:cNvSpPr>
+            <a:spLocks noGrp="1"/>
+          </p:cNvSpPr>
+          <p:nvPr>
+            <p:ph type="body" idx="1"/>
+          </p:nvPr>
+        </p:nvSpPr>
+        <p:spPr/>
+        <p:txBody>
+          <a:bodyPr/>
+          <a:lstStyle/>
+          <a:p>
+            <a:r>
+              <a:rPr lang="en-US" dirty="0"/>
+              <a:t>Python</a:t>
+            </a:r>
+          </a:p>
+          <a:p>
+            <a:pPr lvl="1"/>
+            <a:r>
+              <a:rPr lang="en-US" dirty="0" err="1"/>
+              <a:t>VSCode</a:t>
+            </a:r>
+            <a:r>
+              <a:rPr lang="en-US" dirty="0"/>
+              <a:t>: </a:t>
+            </a:r>
+          </a:p>
+          <a:p>
+            <a:pPr lvl="1"/>
+            <a:r>
+              <a:rPr lang="en-US" dirty="0" err="1"/>
+              <a:t>Jupyter</a:t>
+            </a:r>
+            <a:r>
+              <a:rPr lang="en-US" dirty="0"/>
+              <a:t> notebooks: </a:t>
+            </a:r>
+          </a:p>
+          <a:p>
+            <a:r>
+              <a:rPr lang="en-US" dirty="0"/>
+              <a:t>R</a:t>
+            </a:r>
+          </a:p>
+          <a:p>
+            <a:pPr lvl="1"/>
+            <a:r>
+              <a:rPr lang="en-US" dirty="0"/>
+              <a:t>RStudio</a:t>
+            </a:r>
+          </a:p>
+          <a:p>
+            <a:pPr lvl="1"/>
+            <a:r>
+              <a:rPr lang="en-US" dirty="0" err="1"/>
+              <a:t>Jupyter</a:t>
+            </a:r>
+            <a:r>
+              <a:rPr lang="en-US" dirty="0"/>
+              <a:t> notebooks</a:t>
+            </a:r>
+          </a:p>
+          <a:p>
+            <a:r>
+              <a:rPr lang="en-US" dirty="0"/>
+              <a:t>Stata</a:t>
+            </a:r>
+          </a:p>
+          <a:p>
+            <a:pPr lvl="1"/>
+            <a:r>
+              <a:rPr lang="en-US" dirty="0" err="1"/>
+              <a:t>XStata</a:t>
+            </a:r>
+            <a:endParaRPr lang="en-US" dirty="0"/>
+          </a:p>
+        </p:txBody>
+      </p:sp>
+      <p:sp>
+        <p:nvSpPr>
+          <p:cNvPr id="4" name="Footer Placeholder 3">
+            <a:extLst>
+              <a:ext uri="{FF2B5EF4-FFF2-40B4-BE49-F238E27FC236}">
+                <a16:creationId xmlns:a16="http://schemas.microsoft.com/office/drawing/2014/main" id="{C1893333-12A5-451B-8E41-9161B3546AC3}"/>
+              </a:ext>
+            </a:extLst>
+          </p:cNvPr>
+          <p:cNvSpPr>
+            <a:spLocks noGrp="1"/>
+          </p:cNvSpPr>
+          <p:nvPr>
+            <p:ph type="ftr" idx="11"/>
+          </p:nvPr>
+        </p:nvSpPr>
+        <p:spPr/>
+        <p:txBody>
+          <a:bodyPr/>
+          <a:lstStyle/>
+          <a:p>
+            <a:r>
+              <a:rPr lang="en-US"/>
+              <a:t>Reproducibility Principles</a:t>
+            </a:r>
+          </a:p>
+        </p:txBody>
+      </p:sp>
+    </p:spTree>
+    <p:extLst>
+      <p:ext uri="{BB962C8B-B14F-4D97-AF65-F5344CB8AC3E}">
+        <p14:creationId xmlns:p14="http://schemas.microsoft.com/office/powerpoint/2010/main" val="3966235358"/>
+      </p:ext>
+    </p:extLst>
+  </p:cSld>
+  <p:clrMapOvr>
+    <a:masterClrMapping/>
+  </p:clrMapOvr>
+</p:sld>
+</file>
+
+<file path=ppt/slides/slide4.xml><?xml version="1.0" encoding="utf-8"?>
+<p:sld xmlns:a="http://schemas.openxmlformats.org/drawingml/2006/main" xmlns:r="http://schemas.openxmlformats.org/officeDocument/2006/relationships" xmlns:p="http://schemas.openxmlformats.org/presentationml/2006/main">
+  <p:cSld>
+    <p:spTree>
+      <p:nvGrpSpPr>
+        <p:cNvPr id="1" name="Shape 249"/>
+        <p:cNvGrpSpPr/>
+        <p:nvPr/>
+      </p:nvGrpSpPr>
+      <p:grpSpPr>
+        <a:xfrm>
+          <a:off x="0" y="0"/>
+          <a:ext cx="0" cy="0"/>
+          <a:chOff x="0" y="0"/>
+          <a:chExt cx="0" cy="0"/>
+        </a:xfrm>
+      </p:grpSpPr>
+      <p:sp>
+        <p:nvSpPr>
+          <p:cNvPr id="250" name="Google Shape;250;p28"/>
+          <p:cNvSpPr txBox="1">
+            <a:spLocks noGrp="1"/>
+          </p:cNvSpPr>
+          <p:nvPr>
+            <p:ph type="title"/>
+          </p:nvPr>
+        </p:nvSpPr>
+        <p:spPr>
+          <a:xfrm>
+            <a:off x="457200" y="0"/>
+            <a:ext cx="8645844" cy="1143000"/>
+          </a:xfrm>
+          <a:prstGeom prst="rect">
+            <a:avLst/>
+          </a:prstGeom>
+          <a:noFill/>
+          <a:ln>
+            <a:noFill/>
+          </a:ln>
+        </p:spPr>
+        <p:txBody>
+          <a:bodyPr spcFirstLastPara="1" wrap="square" lIns="91425" tIns="45700" rIns="91425" bIns="45700" anchor="ctr" anchorCtr="0">
+            <a:noAutofit/>
+          </a:bodyPr>
+          <a:lstStyle/>
+          <a:p>
+            <a:pPr>
+              <a:buSzPts val="3200"/>
+            </a:pPr>
+            <a:r>
+              <a:rPr lang="en-US" dirty="0"/>
+              <a:t>Text Editors on KLC</a:t>
+            </a:r>
+          </a:p>
+        </p:txBody>
+      </p:sp>
+      <p:sp>
+        <p:nvSpPr>
+          <p:cNvPr id="251" name="Google Shape;251;p28"/>
+          <p:cNvSpPr txBox="1">
+            <a:spLocks noGrp="1"/>
+          </p:cNvSpPr>
+          <p:nvPr>
+            <p:ph type="ftr" idx="11"/>
+          </p:nvPr>
+        </p:nvSpPr>
+        <p:spPr>
+          <a:xfrm>
+            <a:off x="4572000" y="6506896"/>
+            <a:ext cx="4114800" cy="365100"/>
+          </a:xfrm>
+          <a:prstGeom prst="rect">
+            <a:avLst/>
+          </a:prstGeom>
+          <a:noFill/>
+          <a:ln>
+            <a:noFill/>
+          </a:ln>
+        </p:spPr>
+        <p:txBody>
+          <a:bodyPr spcFirstLastPara="1" wrap="square" lIns="91425" tIns="45700" rIns="91425" bIns="45700" anchor="ctr" anchorCtr="0">
+            <a:noAutofit/>
+          </a:bodyPr>
+          <a:lstStyle/>
+          <a:p>
+            <a:pPr marL="0" lvl="0" indent="0" algn="r" rtl="0">
+              <a:lnSpc>
+                <a:spcPct val="100000"/>
+              </a:lnSpc>
+              <a:spcBef>
+                <a:spcPts val="0"/>
+              </a:spcBef>
+              <a:spcAft>
+                <a:spcPts val="0"/>
+              </a:spcAft>
+              <a:buSzPts val="1400"/>
+              <a:buNone/>
+            </a:pPr>
+            <a:r>
+              <a:rPr lang="en-US"/>
+              <a:t>Reproducibility Principles</a:t>
+            </a:r>
+            <a:endParaRPr/>
+          </a:p>
+        </p:txBody>
+      </p:sp>
+      <p:sp>
+        <p:nvSpPr>
+          <p:cNvPr id="253" name="Google Shape;253;p28"/>
+          <p:cNvSpPr txBox="1"/>
+          <p:nvPr/>
+        </p:nvSpPr>
+        <p:spPr>
+          <a:xfrm>
+            <a:off x="457200" y="1143000"/>
+            <a:ext cx="8312351" cy="5225841"/>
+          </a:xfrm>
+          <a:prstGeom prst="rect">
+            <a:avLst/>
+          </a:prstGeom>
+          <a:noFill/>
+          <a:ln>
+            <a:noFill/>
+          </a:ln>
+        </p:spPr>
+        <p:txBody>
+          <a:bodyPr spcFirstLastPara="1" wrap="square" lIns="91425" tIns="91425" rIns="91425" bIns="91425" anchor="t" anchorCtr="0">
+            <a:noAutofit/>
+          </a:bodyPr>
+          <a:lstStyle/>
+          <a:p>
+            <a:r>
+              <a:rPr lang="en-US" sz="1800" dirty="0"/>
+              <a:t>KLC has several text editors available for you to use. The links below provide the basic syntax for other text editors available to you:</a:t>
+            </a:r>
+            <a:endParaRPr lang="en-US" dirty="0"/>
+          </a:p>
+          <a:p>
+            <a:endParaRPr lang="en-US" sz="1800" b="1" dirty="0"/>
+          </a:p>
+          <a:p>
+            <a:r>
+              <a:rPr lang="en-US" sz="1800" b="1" dirty="0"/>
+              <a:t>Nano</a:t>
+            </a:r>
+            <a:r>
+              <a:rPr lang="en-US" sz="1800" dirty="0"/>
+              <a:t>: From any terminal session on KLC, type:</a:t>
+            </a:r>
+            <a:endParaRPr lang="en-US" dirty="0"/>
+          </a:p>
+          <a:p>
+            <a:r>
+              <a:rPr lang="en-US" sz="1800" dirty="0">
+                <a:latin typeface="Courier New"/>
+              </a:rPr>
+              <a:t>nano &lt;</a:t>
+            </a:r>
+            <a:r>
+              <a:rPr lang="en-US" sz="1800" dirty="0" err="1">
+                <a:latin typeface="Courier New"/>
+              </a:rPr>
+              <a:t>file_name</a:t>
+            </a:r>
+            <a:r>
+              <a:rPr lang="en-US" sz="1800" dirty="0">
+                <a:latin typeface="Courier New"/>
+              </a:rPr>
+              <a:t>&gt;</a:t>
+            </a:r>
+            <a:endParaRPr lang="en-US" dirty="0">
+              <a:latin typeface="Courier New"/>
+            </a:endParaRPr>
+          </a:p>
+          <a:p>
+            <a:r>
+              <a:rPr lang="en-US" sz="1800" dirty="0">
+                <a:hlinkClick r:id="rId3"/>
+              </a:rPr>
+              <a:t>https://www.redhat.com/sysadmin/getting-started-nano</a:t>
+            </a:r>
+            <a:endParaRPr lang="en-US" dirty="0"/>
+          </a:p>
+          <a:p>
+            <a:endParaRPr lang="en-US" sz="1800" dirty="0"/>
+          </a:p>
+          <a:p>
+            <a:r>
+              <a:rPr lang="en-US" sz="1800" b="1" dirty="0"/>
+              <a:t>Emacs</a:t>
+            </a:r>
+            <a:r>
+              <a:rPr lang="en-US" sz="1800" dirty="0"/>
+              <a:t>: From any terminal session on KLC, type:</a:t>
+            </a:r>
+            <a:endParaRPr lang="en-US" dirty="0"/>
+          </a:p>
+          <a:p>
+            <a:r>
+              <a:rPr lang="en-US" sz="1800" dirty="0">
+                <a:latin typeface="Courier New"/>
+              </a:rPr>
+              <a:t>emacs &lt;</a:t>
+            </a:r>
+            <a:r>
+              <a:rPr lang="en-US" sz="1800" dirty="0" err="1">
+                <a:latin typeface="Courier New"/>
+              </a:rPr>
+              <a:t>file_name</a:t>
+            </a:r>
+            <a:r>
+              <a:rPr lang="en-US" sz="1800" dirty="0">
+                <a:latin typeface="Courier New"/>
+              </a:rPr>
+              <a:t>&gt;</a:t>
+            </a:r>
+            <a:endParaRPr lang="en-US" dirty="0">
+              <a:latin typeface="Courier New"/>
+            </a:endParaRPr>
+          </a:p>
+          <a:p>
+            <a:r>
+              <a:rPr lang="en-US" sz="1800" dirty="0">
+                <a:hlinkClick r:id="rId4"/>
+              </a:rPr>
+              <a:t>https://www.redhat.com/sysadmin/beginners-guide-emacs</a:t>
+            </a:r>
+            <a:endParaRPr lang="en-US" dirty="0"/>
+          </a:p>
+          <a:p>
+            <a:endParaRPr lang="en-US" sz="1800" dirty="0"/>
+          </a:p>
+          <a:p>
+            <a:r>
+              <a:rPr lang="en-US" sz="1800" b="1" dirty="0"/>
+              <a:t>Vi</a:t>
+            </a:r>
+            <a:r>
+              <a:rPr lang="en-US" sz="1800" dirty="0"/>
+              <a:t>: From any terminal session on KLC, type:</a:t>
+            </a:r>
+            <a:endParaRPr lang="en-US" dirty="0"/>
+          </a:p>
+          <a:p>
+            <a:r>
+              <a:rPr lang="en-US" sz="1800" dirty="0">
+                <a:latin typeface="Courier New"/>
+              </a:rPr>
+              <a:t>vi &lt;</a:t>
+            </a:r>
+            <a:r>
+              <a:rPr lang="en-US" sz="1800" dirty="0" err="1">
+                <a:latin typeface="Courier New"/>
+              </a:rPr>
+              <a:t>file_name</a:t>
+            </a:r>
+            <a:r>
+              <a:rPr lang="en-US" sz="1800" dirty="0">
+                <a:latin typeface="Courier New"/>
+              </a:rPr>
+              <a:t>&gt;</a:t>
+            </a:r>
+            <a:endParaRPr lang="en-US" dirty="0">
+              <a:latin typeface="Courier New"/>
+            </a:endParaRPr>
+          </a:p>
+          <a:p>
+            <a:r>
+              <a:rPr lang="en-US" sz="1800" dirty="0">
+                <a:hlinkClick r:id="rId5"/>
+              </a:rPr>
+              <a:t>https://www.redhat.com/sysadmin/introduction-vi-editor</a:t>
+            </a:r>
+            <a:endParaRPr lang="en-US" dirty="0"/>
+          </a:p>
+          <a:p>
+            <a:endParaRPr lang="en-US" sz="1800" dirty="0"/>
+          </a:p>
+          <a:p>
+            <a:endParaRPr lang="en-US" sz="1800" dirty="0"/>
+          </a:p>
+          <a:p>
+            <a:pPr marL="742950" indent="-285750">
+              <a:buChar char="•"/>
+            </a:pPr>
+            <a:endParaRPr lang="en-US" sz="1800" dirty="0"/>
+          </a:p>
+          <a:p>
+            <a:pPr marL="114300" lvl="0" algn="l" rtl="0">
+              <a:spcBef>
+                <a:spcPts val="0"/>
+              </a:spcBef>
+              <a:spcAft>
+                <a:spcPts val="0"/>
+              </a:spcAft>
+              <a:buSzPts val="1800"/>
+            </a:pPr>
+            <a:endParaRPr lang="en-US" sz="1800" dirty="0"/>
+          </a:p>
+          <a:p>
+            <a:pPr marL="114300" lvl="0" indent="0" algn="l" rtl="0">
+              <a:spcBef>
+                <a:spcPts val="0"/>
+              </a:spcBef>
+              <a:spcAft>
+                <a:spcPts val="0"/>
+              </a:spcAft>
+              <a:buSzPts val="1800"/>
+              <a:buNone/>
+            </a:pPr>
+            <a:endParaRPr lang="en-US" sz="1800" dirty="0"/>
+          </a:p>
+          <a:p>
+            <a:pPr marL="114300" lvl="0" algn="l" rtl="0">
+              <a:spcBef>
+                <a:spcPts val="0"/>
+              </a:spcBef>
+              <a:spcAft>
+                <a:spcPts val="0"/>
+              </a:spcAft>
+              <a:buSzPts val="1800"/>
+            </a:pPr>
+            <a:endParaRPr lang="en-US" sz="1800" dirty="0"/>
+          </a:p>
+          <a:p>
+            <a:pPr marL="457200" lvl="0" algn="l" rtl="0">
+              <a:spcBef>
+                <a:spcPts val="0"/>
+              </a:spcBef>
+              <a:spcAft>
+                <a:spcPts val="0"/>
+              </a:spcAft>
+            </a:pPr>
+            <a:endParaRPr lang="en-US" sz="600" dirty="0"/>
+          </a:p>
+          <a:p>
+            <a:pPr marL="457200" lvl="0" indent="0" algn="l" rtl="0">
+              <a:spcBef>
+                <a:spcPts val="0"/>
+              </a:spcBef>
+              <a:spcAft>
+                <a:spcPts val="0"/>
+              </a:spcAft>
+              <a:buNone/>
+            </a:pPr>
+            <a:endParaRPr lang="en-US" sz="1800" dirty="0"/>
+          </a:p>
+        </p:txBody>
+      </p:sp>
+    </p:spTree>
+    <p:extLst>
+      <p:ext uri="{BB962C8B-B14F-4D97-AF65-F5344CB8AC3E}">
+        <p14:creationId xmlns:p14="http://schemas.microsoft.com/office/powerpoint/2010/main" val="4134066138"/>
+      </p:ext>
+    </p:extLst>
+  </p:cSld>
+  <p:clrMapOvr>
+    <a:masterClrMapping/>
+  </p:clrMapOvr>
+</p:sld>
+</file>
+
+<file path=ppt/slides/slide5.xml><?xml version="1.0" encoding="utf-8"?>
+<p:sld xmlns:a="http://schemas.openxmlformats.org/drawingml/2006/main" xmlns:r="http://schemas.openxmlformats.org/officeDocument/2006/relationships" xmlns:p="http://schemas.openxmlformats.org/presentationml/2006/main">
+  <p:cSld>
+    <p:spTree>
+      <p:nvGrpSpPr>
+        <p:cNvPr id="1" name=""/>
+        <p:cNvGrpSpPr/>
+        <p:nvPr/>
+      </p:nvGrpSpPr>
+      <p:grpSpPr>
+        <a:xfrm>
+          <a:off x="0" y="0"/>
+          <a:ext cx="0" cy="0"/>
+          <a:chOff x="0" y="0"/>
+          <a:chExt cx="0" cy="0"/>
+        </a:xfrm>
+      </p:grpSpPr>
+      <p:sp>
+        <p:nvSpPr>
+          <p:cNvPr id="2" name="Title 1">
+            <a:extLst>
+              <a:ext uri="{FF2B5EF4-FFF2-40B4-BE49-F238E27FC236}">
                 <a16:creationId xmlns:a16="http://schemas.microsoft.com/office/drawing/2014/main" id="{D4F65689-83D6-2B4F-3518-AC2C24276F57}"/>
               </a:ext>
             </a:extLst>
@@ -9343,368 +9880,6 @@
     <p:extLst>
       <p:ext uri="{BB962C8B-B14F-4D97-AF65-F5344CB8AC3E}">
         <p14:creationId xmlns:p14="http://schemas.microsoft.com/office/powerpoint/2010/main" val="1979856106"/>
-      </p:ext>
-    </p:extLst>
-  </p:cSld>
-  <p:clrMapOvr>
-    <a:masterClrMapping/>
-  </p:clrMapOvr>
-</p:sld>
-</file>
-
-<file path=ppt/slides/slide4.xml><?xml version="1.0" encoding="utf-8"?>
-<p:sld xmlns:a="http://schemas.openxmlformats.org/drawingml/2006/main" xmlns:r="http://schemas.openxmlformats.org/officeDocument/2006/relationships" xmlns:p="http://schemas.openxmlformats.org/presentationml/2006/main">
-  <p:cSld>
-    <p:spTree>
-      <p:nvGrpSpPr>
-        <p:cNvPr id="1" name="Shape 249"/>
-        <p:cNvGrpSpPr/>
-        <p:nvPr/>
-      </p:nvGrpSpPr>
-      <p:grpSpPr>
-        <a:xfrm>
-          <a:off x="0" y="0"/>
-          <a:ext cx="0" cy="0"/>
-          <a:chOff x="0" y="0"/>
-          <a:chExt cx="0" cy="0"/>
-        </a:xfrm>
-      </p:grpSpPr>
-      <p:sp>
-        <p:nvSpPr>
-          <p:cNvPr id="250" name="Google Shape;250;p28"/>
-          <p:cNvSpPr txBox="1">
-            <a:spLocks noGrp="1"/>
-          </p:cNvSpPr>
-          <p:nvPr>
-            <p:ph type="title"/>
-          </p:nvPr>
-        </p:nvSpPr>
-        <p:spPr>
-          <a:xfrm>
-            <a:off x="457200" y="0"/>
-            <a:ext cx="8645844" cy="1143000"/>
-          </a:xfrm>
-          <a:prstGeom prst="rect">
-            <a:avLst/>
-          </a:prstGeom>
-          <a:noFill/>
-          <a:ln>
-            <a:noFill/>
-          </a:ln>
-        </p:spPr>
-        <p:txBody>
-          <a:bodyPr spcFirstLastPara="1" wrap="square" lIns="91425" tIns="45700" rIns="91425" bIns="45700" anchor="ctr" anchorCtr="0">
-            <a:noAutofit/>
-          </a:bodyPr>
-          <a:lstStyle/>
-          <a:p>
-            <a:pPr>
-              <a:buSzPts val="3200"/>
-            </a:pPr>
-            <a:r>
-              <a:rPr lang="en-US" dirty="0"/>
-              <a:t>Text Editors on KLC</a:t>
-            </a:r>
-          </a:p>
-        </p:txBody>
-      </p:sp>
-      <p:sp>
-        <p:nvSpPr>
-          <p:cNvPr id="251" name="Google Shape;251;p28"/>
-          <p:cNvSpPr txBox="1">
-            <a:spLocks noGrp="1"/>
-          </p:cNvSpPr>
-          <p:nvPr>
-            <p:ph type="ftr" idx="11"/>
-          </p:nvPr>
-        </p:nvSpPr>
-        <p:spPr>
-          <a:xfrm>
-            <a:off x="4572000" y="6506896"/>
-            <a:ext cx="4114800" cy="365100"/>
-          </a:xfrm>
-          <a:prstGeom prst="rect">
-            <a:avLst/>
-          </a:prstGeom>
-          <a:noFill/>
-          <a:ln>
-            <a:noFill/>
-          </a:ln>
-        </p:spPr>
-        <p:txBody>
-          <a:bodyPr spcFirstLastPara="1" wrap="square" lIns="91425" tIns="45700" rIns="91425" bIns="45700" anchor="ctr" anchorCtr="0">
-            <a:noAutofit/>
-          </a:bodyPr>
-          <a:lstStyle/>
-          <a:p>
-            <a:pPr marL="0" lvl="0" indent="0" algn="r" rtl="0">
-              <a:lnSpc>
-                <a:spcPct val="100000"/>
-              </a:lnSpc>
-              <a:spcBef>
-                <a:spcPts val="0"/>
-              </a:spcBef>
-              <a:spcAft>
-                <a:spcPts val="0"/>
-              </a:spcAft>
-              <a:buSzPts val="1400"/>
-              <a:buNone/>
-            </a:pPr>
-            <a:r>
-              <a:rPr lang="en-US"/>
-              <a:t>Reproducibility Principles</a:t>
-            </a:r>
-            <a:endParaRPr/>
-          </a:p>
-        </p:txBody>
-      </p:sp>
-      <p:sp>
-        <p:nvSpPr>
-          <p:cNvPr id="253" name="Google Shape;253;p28"/>
-          <p:cNvSpPr txBox="1"/>
-          <p:nvPr/>
-        </p:nvSpPr>
-        <p:spPr>
-          <a:xfrm>
-            <a:off x="457200" y="1143000"/>
-            <a:ext cx="8312351" cy="5225841"/>
-          </a:xfrm>
-          <a:prstGeom prst="rect">
-            <a:avLst/>
-          </a:prstGeom>
-          <a:noFill/>
-          <a:ln>
-            <a:noFill/>
-          </a:ln>
-        </p:spPr>
-        <p:txBody>
-          <a:bodyPr spcFirstLastPara="1" wrap="square" lIns="91425" tIns="91425" rIns="91425" bIns="91425" anchor="t" anchorCtr="0">
-            <a:noAutofit/>
-          </a:bodyPr>
-          <a:lstStyle/>
-          <a:p>
-            <a:r>
-              <a:rPr lang="en-US" sz="1800" dirty="0"/>
-              <a:t>KLC has several text editors available for you to use. The links below provide the basic syntax for other text editors available to you:</a:t>
-            </a:r>
-            <a:endParaRPr lang="en-US" dirty="0"/>
-          </a:p>
-          <a:p>
-            <a:endParaRPr lang="en-US" sz="1800" b="1" dirty="0"/>
-          </a:p>
-          <a:p>
-            <a:r>
-              <a:rPr lang="en-US" sz="1800" b="1" dirty="0"/>
-              <a:t>Nano</a:t>
-            </a:r>
-            <a:r>
-              <a:rPr lang="en-US" sz="1800" dirty="0"/>
-              <a:t>: From any terminal session on KLC, type:</a:t>
-            </a:r>
-            <a:endParaRPr lang="en-US" dirty="0"/>
-          </a:p>
-          <a:p>
-            <a:r>
-              <a:rPr lang="en-US" sz="1800" dirty="0">
-                <a:latin typeface="Courier New"/>
-              </a:rPr>
-              <a:t>nano &lt;</a:t>
-            </a:r>
-            <a:r>
-              <a:rPr lang="en-US" sz="1800" dirty="0" err="1">
-                <a:latin typeface="Courier New"/>
-              </a:rPr>
-              <a:t>file_name</a:t>
-            </a:r>
-            <a:r>
-              <a:rPr lang="en-US" sz="1800" dirty="0">
-                <a:latin typeface="Courier New"/>
-              </a:rPr>
-              <a:t>&gt;</a:t>
-            </a:r>
-            <a:endParaRPr lang="en-US" dirty="0">
-              <a:latin typeface="Courier New"/>
-            </a:endParaRPr>
-          </a:p>
-          <a:p>
-            <a:r>
-              <a:rPr lang="en-US" sz="1800" dirty="0">
-                <a:hlinkClick r:id="rId3"/>
-              </a:rPr>
-              <a:t>https://www.redhat.com/sysadmin/getting-started-nano</a:t>
-            </a:r>
-            <a:endParaRPr lang="en-US" dirty="0"/>
-          </a:p>
-          <a:p>
-            <a:endParaRPr lang="en-US" sz="1800" dirty="0"/>
-          </a:p>
-          <a:p>
-            <a:r>
-              <a:rPr lang="en-US" sz="1800" b="1" dirty="0"/>
-              <a:t>Emacs</a:t>
-            </a:r>
-            <a:r>
-              <a:rPr lang="en-US" sz="1800" dirty="0"/>
-              <a:t>: From any terminal session on KLC, type:</a:t>
-            </a:r>
-            <a:endParaRPr lang="en-US" dirty="0"/>
-          </a:p>
-          <a:p>
-            <a:r>
-              <a:rPr lang="en-US" sz="1800" dirty="0">
-                <a:latin typeface="Courier New"/>
-              </a:rPr>
-              <a:t>emacs &lt;</a:t>
-            </a:r>
-            <a:r>
-              <a:rPr lang="en-US" sz="1800" dirty="0" err="1">
-                <a:latin typeface="Courier New"/>
-              </a:rPr>
-              <a:t>file_name</a:t>
-            </a:r>
-            <a:r>
-              <a:rPr lang="en-US" sz="1800" dirty="0">
-                <a:latin typeface="Courier New"/>
-              </a:rPr>
-              <a:t>&gt;</a:t>
-            </a:r>
-            <a:endParaRPr lang="en-US" dirty="0">
-              <a:latin typeface="Courier New"/>
-            </a:endParaRPr>
-          </a:p>
-          <a:p>
-            <a:r>
-              <a:rPr lang="en-US" sz="1800" dirty="0">
-                <a:hlinkClick r:id="rId4"/>
-              </a:rPr>
-              <a:t>https://www.redhat.com/sysadmin/beginners-guide-emacs</a:t>
-            </a:r>
-            <a:endParaRPr lang="en-US" dirty="0"/>
-          </a:p>
-          <a:p>
-            <a:endParaRPr lang="en-US" sz="1800" dirty="0"/>
-          </a:p>
-          <a:p>
-            <a:r>
-              <a:rPr lang="en-US" sz="1800" b="1" dirty="0"/>
-              <a:t>Vi</a:t>
-            </a:r>
-            <a:r>
-              <a:rPr lang="en-US" sz="1800" dirty="0"/>
-              <a:t>: From any terminal session on KLC, type:</a:t>
-            </a:r>
-            <a:endParaRPr lang="en-US" dirty="0"/>
-          </a:p>
-          <a:p>
-            <a:r>
-              <a:rPr lang="en-US" sz="1800" dirty="0">
-                <a:latin typeface="Courier New"/>
-              </a:rPr>
-              <a:t>vi &lt;</a:t>
-            </a:r>
-            <a:r>
-              <a:rPr lang="en-US" sz="1800" dirty="0" err="1">
-                <a:latin typeface="Courier New"/>
-              </a:rPr>
-              <a:t>file_name</a:t>
-            </a:r>
-            <a:r>
-              <a:rPr lang="en-US" sz="1800" dirty="0">
-                <a:latin typeface="Courier New"/>
-              </a:rPr>
-              <a:t>&gt;</a:t>
-            </a:r>
-            <a:endParaRPr lang="en-US" dirty="0">
-              <a:latin typeface="Courier New"/>
-            </a:endParaRPr>
-          </a:p>
-          <a:p>
-            <a:r>
-              <a:rPr lang="en-US" sz="1800" dirty="0">
-                <a:hlinkClick r:id="rId5"/>
-              </a:rPr>
-              <a:t>https://www.redhat.com/sysadmin/introduction-vi-editor</a:t>
-            </a:r>
-            <a:endParaRPr lang="en-US" dirty="0"/>
-          </a:p>
-          <a:p>
-            <a:endParaRPr lang="en-US" sz="1800" dirty="0"/>
-          </a:p>
-          <a:p>
-            <a:endParaRPr lang="en-US" sz="1800" dirty="0"/>
-          </a:p>
-          <a:p>
-            <a:pPr marL="742950" indent="-285750">
-              <a:buChar char="•"/>
-            </a:pPr>
-            <a:endParaRPr lang="en-US" sz="1800" dirty="0"/>
-          </a:p>
-          <a:p>
-            <a:pPr marL="114300" lvl="0" algn="l" rtl="0">
-              <a:spcBef>
-                <a:spcPts val="0"/>
-              </a:spcBef>
-              <a:spcAft>
-                <a:spcPts val="0"/>
-              </a:spcAft>
-              <a:buSzPts val="1800"/>
-            </a:pPr>
-            <a:endParaRPr lang="en-US" sz="1800" dirty="0"/>
-          </a:p>
-          <a:p>
-            <a:pPr marL="114300" lvl="0" indent="0" algn="l" rtl="0">
-              <a:spcBef>
-                <a:spcPts val="0"/>
-              </a:spcBef>
-              <a:spcAft>
-                <a:spcPts val="0"/>
-              </a:spcAft>
-              <a:buSzPts val="1800"/>
-              <a:buNone/>
-            </a:pPr>
-            <a:endParaRPr lang="en-US" sz="1800" dirty="0"/>
-          </a:p>
-          <a:p>
-            <a:pPr marL="114300" lvl="0" algn="l" rtl="0">
-              <a:spcBef>
-                <a:spcPts val="0"/>
-              </a:spcBef>
-              <a:spcAft>
-                <a:spcPts val="0"/>
-              </a:spcAft>
-              <a:buSzPts val="1800"/>
-            </a:pPr>
-            <a:endParaRPr lang="en-US" sz="1800" dirty="0"/>
-          </a:p>
-          <a:p>
-            <a:pPr marL="457200" lvl="0" algn="l" rtl="0">
-              <a:spcBef>
-                <a:spcPts val="0"/>
-              </a:spcBef>
-              <a:spcAft>
-                <a:spcPts val="0"/>
-              </a:spcAft>
-            </a:pPr>
-            <a:endParaRPr lang="en-US" sz="600" dirty="0"/>
-          </a:p>
-          <a:p>
-            <a:pPr marL="457200" lvl="0" indent="0" algn="l" rtl="0">
-              <a:spcBef>
-                <a:spcPts val="0"/>
-              </a:spcBef>
-              <a:spcAft>
-                <a:spcPts val="0"/>
-              </a:spcAft>
-              <a:buNone/>
-            </a:pPr>
-            <a:endParaRPr lang="en-US" sz="1800" dirty="0"/>
-          </a:p>
-        </p:txBody>
-      </p:sp>
-    </p:spTree>
-    <p:extLst>
-      <p:ext uri="{BB962C8B-B14F-4D97-AF65-F5344CB8AC3E}">
-        <p14:creationId xmlns:p14="http://schemas.microsoft.com/office/powerpoint/2010/main" val="4134066138"/>
       </p:ext>
     </p:extLst>
   </p:cSld>

</xml_diff>

<commit_message>
update session 1 slides
</commit_message>
<xml_diff>
--- a/session-1/Session 1 - KLC Introduction.pptx
+++ b/session-1/Session 1 - KLC Introduction.pptx
@@ -5,15 +5,17 @@
     <p:sldMasterId id="2147483654" r:id="rId1"/>
   </p:sldMasterIdLst>
   <p:notesMasterIdLst>
-    <p:notesMasterId r:id="rId8"/>
+    <p:notesMasterId r:id="rId10"/>
   </p:notesMasterIdLst>
   <p:sldIdLst>
     <p:sldId id="256" r:id="rId2"/>
     <p:sldId id="320" r:id="rId3"/>
     <p:sldId id="322" r:id="rId4"/>
     <p:sldId id="323" r:id="rId5"/>
-    <p:sldId id="285" r:id="rId6"/>
-    <p:sldId id="321" r:id="rId7"/>
+    <p:sldId id="292" r:id="rId6"/>
+    <p:sldId id="299" r:id="rId7"/>
+    <p:sldId id="285" r:id="rId8"/>
+    <p:sldId id="321" r:id="rId9"/>
   </p:sldIdLst>
   <p:sldSz cx="9144000" cy="6858000" type="screen4x3"/>
   <p:notesSz cx="7010400" cy="9236075"/>
@@ -2290,6 +2292,360 @@
   <p:cSld>
     <p:spTree>
       <p:nvGrpSpPr>
+        <p:cNvPr id="1" name="Shape 125"/>
+        <p:cNvGrpSpPr/>
+        <p:nvPr/>
+      </p:nvGrpSpPr>
+      <p:grpSpPr>
+        <a:xfrm>
+          <a:off x="0" y="0"/>
+          <a:ext cx="0" cy="0"/>
+          <a:chOff x="0" y="0"/>
+          <a:chExt cx="0" cy="0"/>
+        </a:xfrm>
+      </p:grpSpPr>
+      <p:sp>
+        <p:nvSpPr>
+          <p:cNvPr id="126" name="Google Shape;126;ge6d407e7a1_0_85:notes"/>
+          <p:cNvSpPr>
+            <a:spLocks noGrp="1" noRot="1" noChangeAspect="1"/>
+          </p:cNvSpPr>
+          <p:nvPr>
+            <p:ph type="sldImg" idx="2"/>
+          </p:nvPr>
+        </p:nvSpPr>
+        <p:spPr>
+          <a:xfrm>
+            <a:off x="1195388" y="692150"/>
+            <a:ext cx="4619625" cy="3463925"/>
+          </a:xfrm>
+          <a:custGeom>
+            <a:avLst/>
+            <a:gdLst/>
+            <a:ahLst/>
+            <a:cxnLst/>
+            <a:rect l="l" t="t" r="r" b="b"/>
+            <a:pathLst>
+              <a:path w="120000" h="120000" extrusionOk="0">
+                <a:moveTo>
+                  <a:pt x="0" y="0"/>
+                </a:moveTo>
+                <a:lnTo>
+                  <a:pt x="120000" y="0"/>
+                </a:lnTo>
+                <a:lnTo>
+                  <a:pt x="120000" y="120000"/>
+                </a:lnTo>
+                <a:lnTo>
+                  <a:pt x="0" y="120000"/>
+                </a:lnTo>
+                <a:close/>
+              </a:path>
+            </a:pathLst>
+          </a:custGeom>
+          <a:noFill/>
+          <a:ln w="12700" cap="flat" cmpd="sng">
+            <a:solidFill>
+              <a:srgbClr val="000000"/>
+            </a:solidFill>
+            <a:prstDash val="solid"/>
+            <a:round/>
+            <a:headEnd type="none" w="sm" len="sm"/>
+            <a:tailEnd type="none" w="sm" len="sm"/>
+          </a:ln>
+        </p:spPr>
+      </p:sp>
+      <p:sp>
+        <p:nvSpPr>
+          <p:cNvPr id="127" name="Google Shape;127;ge6d407e7a1_0_85:notes"/>
+          <p:cNvSpPr txBox="1">
+            <a:spLocks noGrp="1"/>
+          </p:cNvSpPr>
+          <p:nvPr>
+            <p:ph type="body" idx="1"/>
+          </p:nvPr>
+        </p:nvSpPr>
+        <p:spPr>
+          <a:xfrm>
+            <a:off x="701040" y="4387136"/>
+            <a:ext cx="5608200" cy="4156200"/>
+          </a:xfrm>
+          <a:prstGeom prst="rect">
+            <a:avLst/>
+          </a:prstGeom>
+          <a:noFill/>
+          <a:ln>
+            <a:noFill/>
+          </a:ln>
+        </p:spPr>
+        <p:txBody>
+          <a:bodyPr spcFirstLastPara="1" wrap="square" lIns="93175" tIns="46575" rIns="93175" bIns="46575" anchor="t" anchorCtr="0">
+            <a:noAutofit/>
+          </a:bodyPr>
+          <a:lstStyle/>
+          <a:p>
+            <a:pPr marL="0" lvl="0" indent="0" algn="l" rtl="0">
+              <a:lnSpc>
+                <a:spcPct val="100000"/>
+              </a:lnSpc>
+              <a:spcBef>
+                <a:spcPts val="0"/>
+              </a:spcBef>
+              <a:spcAft>
+                <a:spcPts val="0"/>
+              </a:spcAft>
+              <a:buSzPts val="1400"/>
+              <a:buNone/>
+            </a:pPr>
+            <a:endParaRPr dirty="0"/>
+          </a:p>
+        </p:txBody>
+      </p:sp>
+      <p:sp>
+        <p:nvSpPr>
+          <p:cNvPr id="128" name="Google Shape;128;ge6d407e7a1_0_85:notes"/>
+          <p:cNvSpPr txBox="1">
+            <a:spLocks noGrp="1"/>
+          </p:cNvSpPr>
+          <p:nvPr>
+            <p:ph type="sldNum" idx="12"/>
+          </p:nvPr>
+        </p:nvSpPr>
+        <p:spPr>
+          <a:xfrm>
+            <a:off x="3970938" y="8772669"/>
+            <a:ext cx="3037800" cy="461700"/>
+          </a:xfrm>
+          <a:prstGeom prst="rect">
+            <a:avLst/>
+          </a:prstGeom>
+          <a:noFill/>
+          <a:ln>
+            <a:noFill/>
+          </a:ln>
+        </p:spPr>
+        <p:txBody>
+          <a:bodyPr spcFirstLastPara="1" wrap="square" lIns="93175" tIns="46575" rIns="93175" bIns="46575" anchor="b" anchorCtr="0">
+            <a:noAutofit/>
+          </a:bodyPr>
+          <a:lstStyle/>
+          <a:p>
+            <a:pPr marL="0" lvl="0" indent="0" algn="r" rtl="0">
+              <a:lnSpc>
+                <a:spcPct val="100000"/>
+              </a:lnSpc>
+              <a:spcBef>
+                <a:spcPts val="0"/>
+              </a:spcBef>
+              <a:spcAft>
+                <a:spcPts val="0"/>
+              </a:spcAft>
+              <a:buSzPts val="1400"/>
+              <a:buNone/>
+            </a:pPr>
+            <a:fld id="{00000000-1234-1234-1234-123412341234}" type="slidenum">
+              <a:rPr lang="en-US"/>
+              <a:t>5</a:t>
+            </a:fld>
+            <a:endParaRPr/>
+          </a:p>
+        </p:txBody>
+      </p:sp>
+    </p:spTree>
+    <p:extLst>
+      <p:ext uri="{BB962C8B-B14F-4D97-AF65-F5344CB8AC3E}">
+        <p14:creationId xmlns:p14="http://schemas.microsoft.com/office/powerpoint/2010/main" val="1390414966"/>
+      </p:ext>
+    </p:extLst>
+  </p:cSld>
+  <p:clrMapOvr>
+    <a:masterClrMapping/>
+  </p:clrMapOvr>
+</p:notes>
+</file>
+
+<file path=ppt/notesSlides/notesSlide4.xml><?xml version="1.0" encoding="utf-8"?>
+<p:notes xmlns:a="http://schemas.openxmlformats.org/drawingml/2006/main" xmlns:r="http://schemas.openxmlformats.org/officeDocument/2006/relationships" xmlns:p="http://schemas.openxmlformats.org/presentationml/2006/main" showMasterSp="0" showMasterPhAnim="0">
+  <p:cSld>
+    <p:spTree>
+      <p:nvGrpSpPr>
+        <p:cNvPr id="1" name="Shape 125"/>
+        <p:cNvGrpSpPr/>
+        <p:nvPr/>
+      </p:nvGrpSpPr>
+      <p:grpSpPr>
+        <a:xfrm>
+          <a:off x="0" y="0"/>
+          <a:ext cx="0" cy="0"/>
+          <a:chOff x="0" y="0"/>
+          <a:chExt cx="0" cy="0"/>
+        </a:xfrm>
+      </p:grpSpPr>
+      <p:sp>
+        <p:nvSpPr>
+          <p:cNvPr id="126" name="Google Shape;126;ge6d407e7a1_0_85:notes"/>
+          <p:cNvSpPr>
+            <a:spLocks noGrp="1" noRot="1" noChangeAspect="1"/>
+          </p:cNvSpPr>
+          <p:nvPr>
+            <p:ph type="sldImg" idx="2"/>
+          </p:nvPr>
+        </p:nvSpPr>
+        <p:spPr>
+          <a:xfrm>
+            <a:off x="1195388" y="692150"/>
+            <a:ext cx="4619625" cy="3463925"/>
+          </a:xfrm>
+          <a:custGeom>
+            <a:avLst/>
+            <a:gdLst/>
+            <a:ahLst/>
+            <a:cxnLst/>
+            <a:rect l="l" t="t" r="r" b="b"/>
+            <a:pathLst>
+              <a:path w="120000" h="120000" extrusionOk="0">
+                <a:moveTo>
+                  <a:pt x="0" y="0"/>
+                </a:moveTo>
+                <a:lnTo>
+                  <a:pt x="120000" y="0"/>
+                </a:lnTo>
+                <a:lnTo>
+                  <a:pt x="120000" y="120000"/>
+                </a:lnTo>
+                <a:lnTo>
+                  <a:pt x="0" y="120000"/>
+                </a:lnTo>
+                <a:close/>
+              </a:path>
+            </a:pathLst>
+          </a:custGeom>
+          <a:noFill/>
+          <a:ln w="12700" cap="flat" cmpd="sng">
+            <a:solidFill>
+              <a:srgbClr val="000000"/>
+            </a:solidFill>
+            <a:prstDash val="solid"/>
+            <a:round/>
+            <a:headEnd type="none" w="sm" len="sm"/>
+            <a:tailEnd type="none" w="sm" len="sm"/>
+          </a:ln>
+        </p:spPr>
+      </p:sp>
+      <p:sp>
+        <p:nvSpPr>
+          <p:cNvPr id="127" name="Google Shape;127;ge6d407e7a1_0_85:notes"/>
+          <p:cNvSpPr txBox="1">
+            <a:spLocks noGrp="1"/>
+          </p:cNvSpPr>
+          <p:nvPr>
+            <p:ph type="body" idx="1"/>
+          </p:nvPr>
+        </p:nvSpPr>
+        <p:spPr>
+          <a:xfrm>
+            <a:off x="701040" y="4387136"/>
+            <a:ext cx="5608200" cy="4156200"/>
+          </a:xfrm>
+          <a:prstGeom prst="rect">
+            <a:avLst/>
+          </a:prstGeom>
+          <a:noFill/>
+          <a:ln>
+            <a:noFill/>
+          </a:ln>
+        </p:spPr>
+        <p:txBody>
+          <a:bodyPr spcFirstLastPara="1" wrap="square" lIns="93175" tIns="46575" rIns="93175" bIns="46575" anchor="t" anchorCtr="0">
+            <a:noAutofit/>
+          </a:bodyPr>
+          <a:lstStyle/>
+          <a:p>
+            <a:pPr marL="0" lvl="0" indent="0" algn="l" rtl="0">
+              <a:lnSpc>
+                <a:spcPct val="100000"/>
+              </a:lnSpc>
+              <a:spcBef>
+                <a:spcPts val="0"/>
+              </a:spcBef>
+              <a:spcAft>
+                <a:spcPts val="0"/>
+              </a:spcAft>
+              <a:buSzPts val="1400"/>
+              <a:buNone/>
+            </a:pPr>
+            <a:endParaRPr dirty="0"/>
+          </a:p>
+        </p:txBody>
+      </p:sp>
+      <p:sp>
+        <p:nvSpPr>
+          <p:cNvPr id="128" name="Google Shape;128;ge6d407e7a1_0_85:notes"/>
+          <p:cNvSpPr txBox="1">
+            <a:spLocks noGrp="1"/>
+          </p:cNvSpPr>
+          <p:nvPr>
+            <p:ph type="sldNum" idx="12"/>
+          </p:nvPr>
+        </p:nvSpPr>
+        <p:spPr>
+          <a:xfrm>
+            <a:off x="3970938" y="8772669"/>
+            <a:ext cx="3037800" cy="461700"/>
+          </a:xfrm>
+          <a:prstGeom prst="rect">
+            <a:avLst/>
+          </a:prstGeom>
+          <a:noFill/>
+          <a:ln>
+            <a:noFill/>
+          </a:ln>
+        </p:spPr>
+        <p:txBody>
+          <a:bodyPr spcFirstLastPara="1" wrap="square" lIns="93175" tIns="46575" rIns="93175" bIns="46575" anchor="b" anchorCtr="0">
+            <a:noAutofit/>
+          </a:bodyPr>
+          <a:lstStyle/>
+          <a:p>
+            <a:pPr marL="0" lvl="0" indent="0" algn="r" rtl="0">
+              <a:lnSpc>
+                <a:spcPct val="100000"/>
+              </a:lnSpc>
+              <a:spcBef>
+                <a:spcPts val="0"/>
+              </a:spcBef>
+              <a:spcAft>
+                <a:spcPts val="0"/>
+              </a:spcAft>
+              <a:buSzPts val="1400"/>
+              <a:buNone/>
+            </a:pPr>
+            <a:fld id="{00000000-1234-1234-1234-123412341234}" type="slidenum">
+              <a:rPr lang="en-US"/>
+              <a:t>6</a:t>
+            </a:fld>
+            <a:endParaRPr/>
+          </a:p>
+        </p:txBody>
+      </p:sp>
+    </p:spTree>
+    <p:extLst>
+      <p:ext uri="{BB962C8B-B14F-4D97-AF65-F5344CB8AC3E}">
+        <p14:creationId xmlns:p14="http://schemas.microsoft.com/office/powerpoint/2010/main" val="328021311"/>
+      </p:ext>
+    </p:extLst>
+  </p:cSld>
+  <p:clrMapOvr>
+    <a:masterClrMapping/>
+  </p:clrMapOvr>
+</p:notes>
+</file>
+
+<file path=ppt/notesSlides/notesSlide5.xml><?xml version="1.0" encoding="utf-8"?>
+<p:notes xmlns:a="http://schemas.openxmlformats.org/drawingml/2006/main" xmlns:r="http://schemas.openxmlformats.org/officeDocument/2006/relationships" xmlns:p="http://schemas.openxmlformats.org/presentationml/2006/main" showMasterSp="0" showMasterPhAnim="0">
+  <p:cSld>
+    <p:spTree>
+      <p:nvGrpSpPr>
         <p:cNvPr id="1" name="Shape 245"/>
         <p:cNvGrpSpPr/>
         <p:nvPr/>
@@ -2523,7 +2879,7 @@
             </a:pPr>
             <a:fld id="{00000000-1234-1234-1234-123412341234}" type="slidenum">
               <a:rPr lang="en-US"/>
-              <a:t>5</a:t>
+              <a:t>7</a:t>
             </a:fld>
             <a:endParaRPr/>
           </a:p>
@@ -9550,6 +9906,1679 @@
   <p:cSld>
     <p:spTree>
       <p:nvGrpSpPr>
+        <p:cNvPr id="1" name="Shape 129"/>
+        <p:cNvGrpSpPr/>
+        <p:nvPr/>
+      </p:nvGrpSpPr>
+      <p:grpSpPr>
+        <a:xfrm>
+          <a:off x="0" y="0"/>
+          <a:ext cx="0" cy="0"/>
+          <a:chOff x="0" y="0"/>
+          <a:chExt cx="0" cy="0"/>
+        </a:xfrm>
+      </p:grpSpPr>
+      <p:sp>
+        <p:nvSpPr>
+          <p:cNvPr id="130" name="Google Shape;130;ge6d407e7a1_0_85"/>
+          <p:cNvSpPr txBox="1">
+            <a:spLocks noGrp="1"/>
+          </p:cNvSpPr>
+          <p:nvPr>
+            <p:ph type="title"/>
+          </p:nvPr>
+        </p:nvSpPr>
+        <p:spPr>
+          <a:xfrm>
+            <a:off x="457200" y="0"/>
+            <a:ext cx="8645700" cy="1143000"/>
+          </a:xfrm>
+          <a:prstGeom prst="rect">
+            <a:avLst/>
+          </a:prstGeom>
+          <a:noFill/>
+          <a:ln>
+            <a:noFill/>
+          </a:ln>
+        </p:spPr>
+        <p:txBody>
+          <a:bodyPr spcFirstLastPara="1" wrap="square" lIns="91425" tIns="45700" rIns="91425" bIns="45700" anchor="ctr" anchorCtr="0">
+            <a:noAutofit/>
+          </a:bodyPr>
+          <a:lstStyle/>
+          <a:p>
+            <a:pPr marL="0" lvl="0" indent="0" algn="l" rtl="0">
+              <a:lnSpc>
+                <a:spcPct val="100000"/>
+              </a:lnSpc>
+              <a:spcBef>
+                <a:spcPts val="0"/>
+              </a:spcBef>
+              <a:spcAft>
+                <a:spcPts val="0"/>
+              </a:spcAft>
+              <a:buSzPts val="3200"/>
+              <a:buNone/>
+            </a:pPr>
+            <a:r>
+              <a:rPr lang="en-US" dirty="0"/>
+              <a:t>Creating a </a:t>
+            </a:r>
+            <a:r>
+              <a:rPr lang="en-US" dirty="0" err="1"/>
+              <a:t>Conda</a:t>
+            </a:r>
+            <a:r>
+              <a:rPr lang="en-US" dirty="0"/>
+              <a:t> Environment (</a:t>
+            </a:r>
+            <a:r>
+              <a:rPr lang="en-US" dirty="0" err="1"/>
+              <a:t>yaml</a:t>
+            </a:r>
+            <a:r>
+              <a:rPr lang="en-US" dirty="0"/>
+              <a:t> file)</a:t>
+            </a:r>
+            <a:endParaRPr dirty="0"/>
+          </a:p>
+        </p:txBody>
+      </p:sp>
+      <p:sp>
+        <p:nvSpPr>
+          <p:cNvPr id="132" name="Google Shape;132;ge6d407e7a1_0_85"/>
+          <p:cNvSpPr txBox="1">
+            <a:spLocks noGrp="1"/>
+          </p:cNvSpPr>
+          <p:nvPr>
+            <p:ph type="sldNum" idx="12"/>
+          </p:nvPr>
+        </p:nvSpPr>
+        <p:spPr>
+          <a:xfrm>
+            <a:off x="8686800" y="6506896"/>
+            <a:ext cx="416100" cy="365100"/>
+          </a:xfrm>
+          <a:prstGeom prst="rect">
+            <a:avLst/>
+          </a:prstGeom>
+          <a:noFill/>
+          <a:ln>
+            <a:noFill/>
+          </a:ln>
+        </p:spPr>
+        <p:txBody>
+          <a:bodyPr spcFirstLastPara="1" wrap="square" lIns="91425" tIns="45700" rIns="91425" bIns="45700" anchor="ctr" anchorCtr="0">
+            <a:noAutofit/>
+          </a:bodyPr>
+          <a:lstStyle/>
+          <a:p>
+            <a:pPr marL="0" lvl="0" indent="0" algn="r" rtl="0">
+              <a:lnSpc>
+                <a:spcPct val="100000"/>
+              </a:lnSpc>
+              <a:spcBef>
+                <a:spcPts val="0"/>
+              </a:spcBef>
+              <a:spcAft>
+                <a:spcPts val="0"/>
+              </a:spcAft>
+              <a:buSzPts val="1000"/>
+              <a:buNone/>
+            </a:pPr>
+            <a:fld id="{00000000-1234-1234-1234-123412341234}" type="slidenum">
+              <a:rPr lang="en-US"/>
+              <a:t>5</a:t>
+            </a:fld>
+            <a:endParaRPr/>
+          </a:p>
+        </p:txBody>
+      </p:sp>
+      <p:sp>
+        <p:nvSpPr>
+          <p:cNvPr id="133" name="Google Shape;133;ge6d407e7a1_0_85"/>
+          <p:cNvSpPr txBox="1"/>
+          <p:nvPr/>
+        </p:nvSpPr>
+        <p:spPr>
+          <a:xfrm>
+            <a:off x="554324" y="873125"/>
+            <a:ext cx="8386475" cy="5924669"/>
+          </a:xfrm>
+          <a:prstGeom prst="rect">
+            <a:avLst/>
+          </a:prstGeom>
+          <a:noFill/>
+          <a:ln>
+            <a:noFill/>
+          </a:ln>
+        </p:spPr>
+        <p:txBody>
+          <a:bodyPr spcFirstLastPara="1" wrap="square" lIns="91425" tIns="91425" rIns="91425" bIns="91425" anchor="t" anchorCtr="0">
+            <a:spAutoFit/>
+          </a:bodyPr>
+          <a:lstStyle/>
+          <a:p>
+            <a:pPr>
+              <a:buClr>
+                <a:schemeClr val="dk1"/>
+              </a:buClr>
+              <a:buSzPts val="1100"/>
+            </a:pPr>
+            <a:r>
+              <a:rPr lang="en-US" sz="1800" dirty="0"/>
+              <a:t>The basic commands for creating a </a:t>
+            </a:r>
+            <a:r>
+              <a:rPr lang="en-US" sz="1800" dirty="0" err="1"/>
+              <a:t>conda</a:t>
+            </a:r>
+            <a:r>
+              <a:rPr lang="en-US" sz="1800" dirty="0"/>
+              <a:t> environment only allow you to install one package at a time. A </a:t>
+            </a:r>
+            <a:r>
+              <a:rPr lang="en-US" sz="1800" dirty="0" err="1"/>
+              <a:t>yaml</a:t>
+            </a:r>
+            <a:r>
+              <a:rPr lang="en-US" sz="1800" dirty="0"/>
+              <a:t> file allows you to install multiple packages while accounting for dependencies between libraries.  </a:t>
+            </a:r>
+          </a:p>
+          <a:p>
+            <a:pPr>
+              <a:buClr>
+                <a:schemeClr val="dk1"/>
+              </a:buClr>
+              <a:buSzPts val="1100"/>
+            </a:pPr>
+            <a:endParaRPr lang="en-US" sz="1800" dirty="0"/>
+          </a:p>
+          <a:p>
+            <a:pPr>
+              <a:buClr>
+                <a:schemeClr val="dk1"/>
+              </a:buClr>
+              <a:buSzPts val="1100"/>
+            </a:pPr>
+            <a:r>
+              <a:rPr lang="en-US" sz="1800" dirty="0"/>
+              <a:t>Using a text editor, create the following file on KLC called </a:t>
+            </a:r>
+            <a:r>
+              <a:rPr lang="en-US" sz="1800" dirty="0" err="1">
+                <a:highlight>
+                  <a:srgbClr val="C0C0C0"/>
+                </a:highlight>
+                <a:latin typeface="Consolas" panose="020B0609020204030204" pitchFamily="49" charset="0"/>
+                <a:cs typeface="Consolas" panose="020B0609020204030204" pitchFamily="49" charset="0"/>
+              </a:rPr>
+              <a:t>r_env.yml</a:t>
+            </a:r>
+            <a:endParaRPr lang="en-US" sz="1800" dirty="0">
+              <a:highlight>
+                <a:srgbClr val="C0C0C0"/>
+              </a:highlight>
+            </a:endParaRPr>
+          </a:p>
+          <a:p>
+            <a:pPr>
+              <a:buClr>
+                <a:schemeClr val="dk1"/>
+              </a:buClr>
+              <a:buSzPts val="1100"/>
+            </a:pPr>
+            <a:endParaRPr sz="1700" dirty="0"/>
+          </a:p>
+          <a:p>
+            <a:endParaRPr lang="en-US" sz="1700" dirty="0"/>
+          </a:p>
+          <a:p>
+            <a:endParaRPr lang="en-US" sz="1700" dirty="0"/>
+          </a:p>
+          <a:p>
+            <a:endParaRPr lang="en-US" sz="1700" dirty="0"/>
+          </a:p>
+          <a:p>
+            <a:endParaRPr lang="en-US" sz="1700" dirty="0"/>
+          </a:p>
+          <a:p>
+            <a:endParaRPr lang="en-US" sz="1700" dirty="0"/>
+          </a:p>
+          <a:p>
+            <a:endParaRPr lang="en-US" sz="1700" dirty="0"/>
+          </a:p>
+          <a:p>
+            <a:endParaRPr lang="en-US" sz="1700" dirty="0"/>
+          </a:p>
+          <a:p>
+            <a:endParaRPr lang="en-US" sz="1700" dirty="0"/>
+          </a:p>
+          <a:p>
+            <a:r>
+              <a:rPr lang="en-US" sz="1700" dirty="0"/>
+              <a:t>	</a:t>
+            </a:r>
+            <a:endParaRPr sz="1800" dirty="0">
+              <a:solidFill>
+                <a:schemeClr val="dk1"/>
+              </a:solidFill>
+              <a:highlight>
+                <a:srgbClr val="CCCCCC"/>
+              </a:highlight>
+              <a:latin typeface="Consolas"/>
+              <a:ea typeface="Consolas"/>
+              <a:cs typeface="Consolas"/>
+              <a:sym typeface="Consolas"/>
+            </a:endParaRPr>
+          </a:p>
+          <a:p>
+            <a:pPr marL="0" lvl="0" indent="0" algn="l" rtl="0">
+              <a:spcBef>
+                <a:spcPts val="0"/>
+              </a:spcBef>
+              <a:spcAft>
+                <a:spcPts val="0"/>
+              </a:spcAft>
+              <a:buClr>
+                <a:schemeClr val="dk1"/>
+              </a:buClr>
+              <a:buSzPts val="1100"/>
+              <a:buFont typeface="Arial"/>
+              <a:buNone/>
+            </a:pPr>
+            <a:endParaRPr lang="en-US" sz="1800" dirty="0">
+              <a:solidFill>
+                <a:schemeClr val="dk1"/>
+              </a:solidFill>
+            </a:endParaRPr>
+          </a:p>
+          <a:p>
+            <a:pPr>
+              <a:buClr>
+                <a:schemeClr val="dk1"/>
+              </a:buClr>
+              <a:buSzPts val="1100"/>
+            </a:pPr>
+            <a:endParaRPr lang="en-US" sz="1800" dirty="0">
+              <a:solidFill>
+                <a:schemeClr val="dk1"/>
+              </a:solidFill>
+            </a:endParaRPr>
+          </a:p>
+          <a:p>
+            <a:pPr>
+              <a:buClr>
+                <a:schemeClr val="dk1"/>
+              </a:buClr>
+              <a:buSzPts val="1100"/>
+            </a:pPr>
+            <a:r>
+              <a:rPr lang="en-US" sz="1800" dirty="0">
+                <a:solidFill>
+                  <a:schemeClr val="dk1"/>
+                </a:solidFill>
+              </a:rPr>
+              <a:t>You can run this file using the mamba module on KLC to create the environment</a:t>
+            </a:r>
+          </a:p>
+          <a:p>
+            <a:pPr>
+              <a:buClr>
+                <a:schemeClr val="dk1"/>
+              </a:buClr>
+              <a:buSzPts val="1100"/>
+            </a:pPr>
+            <a:endParaRPr lang="en-US" sz="200" dirty="0">
+              <a:solidFill>
+                <a:schemeClr val="dk1"/>
+              </a:solidFill>
+              <a:highlight>
+                <a:srgbClr val="C0C0C0"/>
+              </a:highlight>
+            </a:endParaRPr>
+          </a:p>
+          <a:p>
+            <a:pPr marL="920750" lvl="4">
+              <a:buClr>
+                <a:schemeClr val="dk1"/>
+              </a:buClr>
+              <a:buSzPts val="1100"/>
+            </a:pPr>
+            <a:r>
+              <a:rPr lang="en-US" sz="1800" dirty="0">
+                <a:solidFill>
+                  <a:schemeClr val="dk1"/>
+                </a:solidFill>
+                <a:highlight>
+                  <a:srgbClr val="C0C0C0"/>
+                </a:highlight>
+                <a:latin typeface="Consolas"/>
+                <a:cs typeface="Consolas"/>
+              </a:rPr>
+              <a:t>module load mamba</a:t>
+            </a:r>
+          </a:p>
+          <a:p>
+            <a:pPr lvl="4" indent="920750">
+              <a:buClr>
+                <a:schemeClr val="dk1"/>
+              </a:buClr>
+              <a:buSzPts val="1100"/>
+            </a:pPr>
+            <a:r>
+              <a:rPr lang="en-US" sz="1800" dirty="0">
+                <a:solidFill>
+                  <a:schemeClr val="dk1"/>
+                </a:solidFill>
+                <a:highlight>
+                  <a:srgbClr val="C0C0C0"/>
+                </a:highlight>
+                <a:latin typeface="Consolas"/>
+                <a:cs typeface="Consolas"/>
+                <a:sym typeface="Consolas"/>
+              </a:rPr>
+              <a:t>mamba</a:t>
+            </a:r>
+            <a:r>
+              <a:rPr lang="en-US" sz="1800" dirty="0">
+                <a:solidFill>
+                  <a:schemeClr val="dk1"/>
+                </a:solidFill>
+                <a:highlight>
+                  <a:srgbClr val="C0C0C0"/>
+                </a:highlight>
+                <a:latin typeface="Consolas"/>
+                <a:ea typeface="Consolas"/>
+                <a:cs typeface="Consolas"/>
+                <a:sym typeface="Consolas"/>
+              </a:rPr>
+              <a:t> env create -f </a:t>
+            </a:r>
+            <a:r>
+              <a:rPr lang="en-US" sz="1800" dirty="0" err="1">
+                <a:solidFill>
+                  <a:schemeClr val="dk1"/>
+                </a:solidFill>
+                <a:highlight>
+                  <a:srgbClr val="C0C0C0"/>
+                </a:highlight>
+                <a:latin typeface="Consolas"/>
+                <a:ea typeface="Consolas"/>
+                <a:cs typeface="Consolas"/>
+                <a:sym typeface="Consolas"/>
+              </a:rPr>
+              <a:t>r_env.yml</a:t>
+            </a:r>
+            <a:endParaRPr lang="en-US" sz="1800" dirty="0">
+              <a:solidFill>
+                <a:schemeClr val="dk1"/>
+              </a:solidFill>
+              <a:highlight>
+                <a:srgbClr val="C0C0C0"/>
+              </a:highlight>
+              <a:latin typeface="Consolas"/>
+              <a:ea typeface="Consolas"/>
+              <a:cs typeface="Consolas"/>
+              <a:sym typeface="Consolas"/>
+            </a:endParaRPr>
+          </a:p>
+          <a:p>
+            <a:pPr>
+              <a:buClr>
+                <a:schemeClr val="dk1"/>
+              </a:buClr>
+              <a:buSzPts val="1100"/>
+            </a:pPr>
+            <a:endParaRPr lang="en-US" sz="300" dirty="0">
+              <a:solidFill>
+                <a:schemeClr val="dk1"/>
+              </a:solidFill>
+              <a:highlight>
+                <a:srgbClr val="C0C0C0"/>
+              </a:highlight>
+              <a:latin typeface="Consolas"/>
+              <a:ea typeface="Consolas"/>
+              <a:cs typeface="Consolas"/>
+              <a:sym typeface="Consolas"/>
+            </a:endParaRPr>
+          </a:p>
+          <a:p>
+            <a:pPr>
+              <a:buClr>
+                <a:schemeClr val="dk1"/>
+              </a:buClr>
+              <a:buSzPts val="1100"/>
+            </a:pPr>
+            <a:endParaRPr sz="1800" dirty="0">
+              <a:solidFill>
+                <a:schemeClr val="dk1"/>
+              </a:solidFill>
+              <a:highlight>
+                <a:srgbClr val="CCCCCC"/>
+              </a:highlight>
+              <a:latin typeface="Consolas"/>
+              <a:ea typeface="Consolas"/>
+              <a:cs typeface="Consolas"/>
+              <a:sym typeface="Consolas"/>
+            </a:endParaRPr>
+          </a:p>
+        </p:txBody>
+      </p:sp>
+      <p:sp>
+        <p:nvSpPr>
+          <p:cNvPr id="3" name="Google Shape;94;ge58bbe3d21_0_49">
+            <a:extLst>
+              <a:ext uri="{FF2B5EF4-FFF2-40B4-BE49-F238E27FC236}">
+                <a16:creationId xmlns:a16="http://schemas.microsoft.com/office/drawing/2014/main" id="{9133911F-4802-28FD-084F-F3BF4019CC04}"/>
+              </a:ext>
+            </a:extLst>
+          </p:cNvPr>
+          <p:cNvSpPr txBox="1">
+            <a:spLocks noGrp="1"/>
+          </p:cNvSpPr>
+          <p:nvPr>
+            <p:ph type="ftr" idx="11"/>
+          </p:nvPr>
+        </p:nvSpPr>
+        <p:spPr>
+          <a:xfrm>
+            <a:off x="4572000" y="6506896"/>
+            <a:ext cx="4114800" cy="365100"/>
+          </a:xfrm>
+          <a:prstGeom prst="rect">
+            <a:avLst/>
+          </a:prstGeom>
+          <a:noFill/>
+          <a:ln>
+            <a:noFill/>
+          </a:ln>
+        </p:spPr>
+        <p:txBody>
+          <a:bodyPr spcFirstLastPara="1" wrap="square" lIns="91425" tIns="45700" rIns="91425" bIns="45700" anchor="ctr" anchorCtr="0">
+            <a:noAutofit/>
+          </a:bodyPr>
+          <a:lstStyle/>
+          <a:p>
+            <a:pPr marL="0" lvl="0" indent="0" algn="r" rtl="0">
+              <a:lnSpc>
+                <a:spcPct val="100000"/>
+              </a:lnSpc>
+              <a:spcBef>
+                <a:spcPts val="0"/>
+              </a:spcBef>
+              <a:spcAft>
+                <a:spcPts val="0"/>
+              </a:spcAft>
+              <a:buSzPts val="1400"/>
+              <a:buNone/>
+            </a:pPr>
+            <a:r>
+              <a:rPr lang="en-US" dirty="0"/>
+              <a:t>WRDS</a:t>
+            </a:r>
+            <a:endParaRPr dirty="0"/>
+          </a:p>
+        </p:txBody>
+      </p:sp>
+      <p:sp>
+        <p:nvSpPr>
+          <p:cNvPr id="4" name="Google Shape;120;ge6d407e7a1_0_27">
+            <a:extLst>
+              <a:ext uri="{FF2B5EF4-FFF2-40B4-BE49-F238E27FC236}">
+                <a16:creationId xmlns:a16="http://schemas.microsoft.com/office/drawing/2014/main" id="{E91FEBE2-45B1-882D-045B-297420AC379B}"/>
+              </a:ext>
+            </a:extLst>
+          </p:cNvPr>
+          <p:cNvSpPr/>
+          <p:nvPr/>
+        </p:nvSpPr>
+        <p:spPr>
+          <a:xfrm>
+            <a:off x="2075366" y="2505354"/>
+            <a:ext cx="4272600" cy="2886361"/>
+          </a:xfrm>
+          <a:prstGeom prst="flowChartAlternateProcess">
+            <a:avLst/>
+          </a:prstGeom>
+          <a:solidFill>
+            <a:schemeClr val="lt2"/>
+          </a:solidFill>
+          <a:ln w="9525" cap="flat" cmpd="sng">
+            <a:solidFill>
+              <a:schemeClr val="dk2"/>
+            </a:solidFill>
+            <a:prstDash val="solid"/>
+            <a:round/>
+            <a:headEnd type="none" w="sm" len="sm"/>
+            <a:tailEnd type="none" w="sm" len="sm"/>
+          </a:ln>
+        </p:spPr>
+        <p:txBody>
+          <a:bodyPr spcFirstLastPara="1" wrap="square" lIns="91425" tIns="91425" rIns="91425" bIns="91425" anchor="ctr" anchorCtr="0">
+            <a:noAutofit/>
+          </a:bodyPr>
+          <a:lstStyle/>
+          <a:p>
+            <a:pPr lvl="2"/>
+            <a:r>
+              <a:rPr lang="en-US" dirty="0">
+                <a:latin typeface="Consolas" panose="020B0609020204030204" pitchFamily="49" charset="0"/>
+                <a:cs typeface="Consolas" panose="020B0609020204030204" pitchFamily="49" charset="0"/>
+              </a:rPr>
+              <a:t>    # Create </a:t>
+            </a:r>
+            <a:r>
+              <a:rPr lang="en-US" dirty="0" err="1">
+                <a:latin typeface="Consolas" panose="020B0609020204030204" pitchFamily="49" charset="0"/>
+                <a:cs typeface="Consolas" panose="020B0609020204030204" pitchFamily="49" charset="0"/>
+              </a:rPr>
+              <a:t>r_env.yml</a:t>
+            </a:r>
+            <a:r>
+              <a:rPr lang="en-US" dirty="0">
+                <a:latin typeface="Consolas" panose="020B0609020204030204" pitchFamily="49" charset="0"/>
+                <a:cs typeface="Consolas" panose="020B0609020204030204" pitchFamily="49" charset="0"/>
+              </a:rPr>
+              <a:t> file</a:t>
+            </a:r>
+          </a:p>
+          <a:p>
+            <a:pPr lvl="2"/>
+            <a:r>
+              <a:rPr lang="en-US" dirty="0">
+                <a:latin typeface="Consolas" panose="020B0609020204030204" pitchFamily="49" charset="0"/>
+                <a:cs typeface="Consolas" panose="020B0609020204030204" pitchFamily="49" charset="0"/>
+              </a:rPr>
+              <a:t>    # begin </a:t>
+            </a:r>
+            <a:r>
+              <a:rPr lang="en-US" dirty="0" err="1">
+                <a:latin typeface="Consolas" panose="020B0609020204030204" pitchFamily="49" charset="0"/>
+                <a:cs typeface="Consolas" panose="020B0609020204030204" pitchFamily="49" charset="0"/>
+              </a:rPr>
+              <a:t>r_env.yml</a:t>
+            </a:r>
+            <a:r>
+              <a:rPr lang="en-US" dirty="0">
+                <a:latin typeface="Consolas" panose="020B0609020204030204" pitchFamily="49" charset="0"/>
+                <a:cs typeface="Consolas" panose="020B0609020204030204" pitchFamily="49" charset="0"/>
+              </a:rPr>
+              <a:t> </a:t>
+            </a:r>
+          </a:p>
+          <a:p>
+            <a:pPr lvl="2"/>
+            <a:r>
+              <a:rPr lang="en-US" sz="300" dirty="0">
+                <a:latin typeface="Consolas" panose="020B0609020204030204" pitchFamily="49" charset="0"/>
+                <a:cs typeface="Consolas" panose="020B0609020204030204" pitchFamily="49" charset="0"/>
+              </a:rPr>
+              <a:t> </a:t>
+            </a:r>
+          </a:p>
+          <a:p>
+            <a:pPr lvl="2"/>
+            <a:r>
+              <a:rPr lang="en-US" dirty="0">
+                <a:latin typeface="Consolas" panose="020B0609020204030204" pitchFamily="49" charset="0"/>
+                <a:cs typeface="Consolas" panose="020B0609020204030204" pitchFamily="49" charset="0"/>
+              </a:rPr>
+              <a:t>    name: </a:t>
+            </a:r>
+            <a:r>
+              <a:rPr lang="en-US" dirty="0" err="1">
+                <a:latin typeface="Consolas" panose="020B0609020204030204" pitchFamily="49" charset="0"/>
+                <a:cs typeface="Consolas" panose="020B0609020204030204" pitchFamily="49" charset="0"/>
+              </a:rPr>
+              <a:t>r_env</a:t>
+            </a:r>
+            <a:endParaRPr lang="en-US" dirty="0">
+              <a:latin typeface="Consolas" panose="020B0609020204030204" pitchFamily="49" charset="0"/>
+              <a:cs typeface="Consolas" panose="020B0609020204030204" pitchFamily="49" charset="0"/>
+            </a:endParaRPr>
+          </a:p>
+          <a:p>
+            <a:pPr lvl="2"/>
+            <a:r>
+              <a:rPr lang="en-US" sz="300" dirty="0">
+                <a:latin typeface="Consolas" panose="020B0609020204030204" pitchFamily="49" charset="0"/>
+                <a:cs typeface="Consolas" panose="020B0609020204030204" pitchFamily="49" charset="0"/>
+              </a:rPr>
+              <a:t> </a:t>
+            </a:r>
+          </a:p>
+          <a:p>
+            <a:pPr lvl="2"/>
+            <a:r>
+              <a:rPr lang="en-US" dirty="0">
+                <a:latin typeface="Consolas" panose="020B0609020204030204" pitchFamily="49" charset="0"/>
+                <a:cs typeface="Consolas" panose="020B0609020204030204" pitchFamily="49" charset="0"/>
+              </a:rPr>
+              <a:t>    channels:</a:t>
+            </a:r>
+          </a:p>
+          <a:p>
+            <a:pPr lvl="2"/>
+            <a:r>
+              <a:rPr lang="en-US" dirty="0">
+                <a:latin typeface="Consolas" panose="020B0609020204030204" pitchFamily="49" charset="0"/>
+                <a:cs typeface="Consolas" panose="020B0609020204030204" pitchFamily="49" charset="0"/>
+              </a:rPr>
+              <a:t>      - r</a:t>
+            </a:r>
+          </a:p>
+          <a:p>
+            <a:pPr lvl="2"/>
+            <a:r>
+              <a:rPr lang="en-US" dirty="0">
+                <a:latin typeface="Consolas" panose="020B0609020204030204" pitchFamily="49" charset="0"/>
+                <a:cs typeface="Consolas" panose="020B0609020204030204" pitchFamily="49" charset="0"/>
+              </a:rPr>
+              <a:t>      - </a:t>
+            </a:r>
+            <a:r>
+              <a:rPr lang="en-US" dirty="0" err="1">
+                <a:latin typeface="Consolas" panose="020B0609020204030204" pitchFamily="49" charset="0"/>
+                <a:cs typeface="Consolas" panose="020B0609020204030204" pitchFamily="49" charset="0"/>
+              </a:rPr>
+              <a:t>conda</a:t>
+            </a:r>
+            <a:r>
+              <a:rPr lang="en-US" dirty="0">
+                <a:latin typeface="Consolas" panose="020B0609020204030204" pitchFamily="49" charset="0"/>
+                <a:cs typeface="Consolas" panose="020B0609020204030204" pitchFamily="49" charset="0"/>
+              </a:rPr>
+              <a:t>-forge</a:t>
+            </a:r>
+          </a:p>
+          <a:p>
+            <a:pPr lvl="2"/>
+            <a:r>
+              <a:rPr lang="en-US" dirty="0">
+                <a:latin typeface="Consolas" panose="020B0609020204030204" pitchFamily="49" charset="0"/>
+                <a:cs typeface="Consolas" panose="020B0609020204030204" pitchFamily="49" charset="0"/>
+              </a:rPr>
+              <a:t>    dependencies:</a:t>
+            </a:r>
+          </a:p>
+          <a:p>
+            <a:pPr lvl="2"/>
+            <a:r>
+              <a:rPr lang="en-US" dirty="0">
+                <a:latin typeface="Consolas" panose="020B0609020204030204" pitchFamily="49" charset="0"/>
+                <a:cs typeface="Consolas" panose="020B0609020204030204" pitchFamily="49" charset="0"/>
+              </a:rPr>
+              <a:t>      - r-base = 4.1.1</a:t>
+            </a:r>
+          </a:p>
+          <a:p>
+            <a:pPr lvl="4"/>
+            <a:r>
+              <a:rPr lang="en-US" dirty="0">
+                <a:latin typeface="Consolas" panose="020B0609020204030204" pitchFamily="49" charset="0"/>
+                <a:cs typeface="Consolas" panose="020B0609020204030204" pitchFamily="49" charset="0"/>
+              </a:rPr>
+              <a:t>      - r-</a:t>
+            </a:r>
+            <a:r>
+              <a:rPr lang="en-US" dirty="0" err="1">
+                <a:latin typeface="Consolas" panose="020B0609020204030204" pitchFamily="49" charset="0"/>
+                <a:cs typeface="Consolas" panose="020B0609020204030204" pitchFamily="49" charset="0"/>
+              </a:rPr>
+              <a:t>data.table</a:t>
+            </a:r>
+            <a:endParaRPr lang="en-US" dirty="0">
+              <a:latin typeface="Consolas" panose="020B0609020204030204" pitchFamily="49" charset="0"/>
+              <a:cs typeface="Consolas" panose="020B0609020204030204" pitchFamily="49" charset="0"/>
+            </a:endParaRPr>
+          </a:p>
+          <a:p>
+            <a:pPr lvl="2"/>
+            <a:r>
+              <a:rPr lang="en-US" sz="300" dirty="0">
+                <a:latin typeface="Consolas" panose="020B0609020204030204" pitchFamily="49" charset="0"/>
+                <a:cs typeface="Consolas" panose="020B0609020204030204" pitchFamily="49" charset="0"/>
+              </a:rPr>
+              <a:t> </a:t>
+            </a:r>
+          </a:p>
+          <a:p>
+            <a:pPr lvl="2"/>
+            <a:r>
+              <a:rPr lang="en-US" dirty="0">
+                <a:latin typeface="Consolas" panose="020B0609020204030204" pitchFamily="49" charset="0"/>
+                <a:cs typeface="Consolas" panose="020B0609020204030204" pitchFamily="49" charset="0"/>
+              </a:rPr>
+              <a:t>    # end </a:t>
+            </a:r>
+            <a:r>
+              <a:rPr lang="en-US" dirty="0" err="1">
+                <a:latin typeface="Consolas" panose="020B0609020204030204" pitchFamily="49" charset="0"/>
+                <a:cs typeface="Consolas" panose="020B0609020204030204" pitchFamily="49" charset="0"/>
+              </a:rPr>
+              <a:t>r_env.yml</a:t>
+            </a:r>
+            <a:endParaRPr lang="en-US" dirty="0">
+              <a:latin typeface="Consolas" panose="020B0609020204030204" pitchFamily="49" charset="0"/>
+              <a:cs typeface="Consolas" panose="020B0609020204030204" pitchFamily="49" charset="0"/>
+            </a:endParaRPr>
+          </a:p>
+          <a:p>
+            <a:pPr marL="0" lvl="0" indent="0" algn="l" rtl="0">
+              <a:spcBef>
+                <a:spcPts val="0"/>
+              </a:spcBef>
+              <a:spcAft>
+                <a:spcPts val="0"/>
+              </a:spcAft>
+              <a:buNone/>
+            </a:pPr>
+            <a:endParaRPr lang="en-US" dirty="0"/>
+          </a:p>
+        </p:txBody>
+      </p:sp>
+    </p:spTree>
+    <p:extLst>
+      <p:ext uri="{BB962C8B-B14F-4D97-AF65-F5344CB8AC3E}">
+        <p14:creationId xmlns:p14="http://schemas.microsoft.com/office/powerpoint/2010/main" val="2208496741"/>
+      </p:ext>
+    </p:extLst>
+  </p:cSld>
+  <p:clrMapOvr>
+    <a:masterClrMapping/>
+  </p:clrMapOvr>
+</p:sld>
+</file>
+
+<file path=ppt/slides/slide6.xml><?xml version="1.0" encoding="utf-8"?>
+<p:sld xmlns:a="http://schemas.openxmlformats.org/drawingml/2006/main" xmlns:r="http://schemas.openxmlformats.org/officeDocument/2006/relationships" xmlns:p="http://schemas.openxmlformats.org/presentationml/2006/main">
+  <p:cSld>
+    <p:spTree>
+      <p:nvGrpSpPr>
+        <p:cNvPr id="1" name="Shape 129"/>
+        <p:cNvGrpSpPr/>
+        <p:nvPr/>
+      </p:nvGrpSpPr>
+      <p:grpSpPr>
+        <a:xfrm>
+          <a:off x="0" y="0"/>
+          <a:ext cx="0" cy="0"/>
+          <a:chOff x="0" y="0"/>
+          <a:chExt cx="0" cy="0"/>
+        </a:xfrm>
+      </p:grpSpPr>
+      <p:sp>
+        <p:nvSpPr>
+          <p:cNvPr id="130" name="Google Shape;130;ge6d407e7a1_0_85"/>
+          <p:cNvSpPr txBox="1">
+            <a:spLocks noGrp="1"/>
+          </p:cNvSpPr>
+          <p:nvPr>
+            <p:ph type="title"/>
+          </p:nvPr>
+        </p:nvSpPr>
+        <p:spPr>
+          <a:xfrm>
+            <a:off x="457200" y="0"/>
+            <a:ext cx="8645700" cy="1143000"/>
+          </a:xfrm>
+          <a:prstGeom prst="rect">
+            <a:avLst/>
+          </a:prstGeom>
+          <a:noFill/>
+          <a:ln>
+            <a:noFill/>
+          </a:ln>
+        </p:spPr>
+        <p:txBody>
+          <a:bodyPr spcFirstLastPara="1" wrap="square" lIns="91425" tIns="45700" rIns="91425" bIns="45700" anchor="ctr" anchorCtr="0">
+            <a:noAutofit/>
+          </a:bodyPr>
+          <a:lstStyle/>
+          <a:p>
+            <a:pPr marL="0" lvl="0" indent="0" algn="l" rtl="0">
+              <a:lnSpc>
+                <a:spcPct val="100000"/>
+              </a:lnSpc>
+              <a:spcBef>
+                <a:spcPts val="0"/>
+              </a:spcBef>
+              <a:spcAft>
+                <a:spcPts val="0"/>
+              </a:spcAft>
+              <a:buSzPts val="3200"/>
+              <a:buNone/>
+            </a:pPr>
+            <a:r>
+              <a:rPr lang="en-US" dirty="0"/>
+              <a:t>Activating a </a:t>
+            </a:r>
+            <a:r>
+              <a:rPr lang="en-US" dirty="0" err="1"/>
+              <a:t>Conda</a:t>
+            </a:r>
+            <a:r>
+              <a:rPr lang="en-US" dirty="0"/>
+              <a:t> Environment</a:t>
+            </a:r>
+            <a:endParaRPr dirty="0"/>
+          </a:p>
+        </p:txBody>
+      </p:sp>
+      <p:sp>
+        <p:nvSpPr>
+          <p:cNvPr id="132" name="Google Shape;132;ge6d407e7a1_0_85"/>
+          <p:cNvSpPr txBox="1">
+            <a:spLocks noGrp="1"/>
+          </p:cNvSpPr>
+          <p:nvPr>
+            <p:ph type="sldNum" idx="12"/>
+          </p:nvPr>
+        </p:nvSpPr>
+        <p:spPr>
+          <a:xfrm>
+            <a:off x="8686800" y="6506896"/>
+            <a:ext cx="416100" cy="365100"/>
+          </a:xfrm>
+          <a:prstGeom prst="rect">
+            <a:avLst/>
+          </a:prstGeom>
+          <a:noFill/>
+          <a:ln>
+            <a:noFill/>
+          </a:ln>
+        </p:spPr>
+        <p:txBody>
+          <a:bodyPr spcFirstLastPara="1" wrap="square" lIns="91425" tIns="45700" rIns="91425" bIns="45700" anchor="ctr" anchorCtr="0">
+            <a:noAutofit/>
+          </a:bodyPr>
+          <a:lstStyle/>
+          <a:p>
+            <a:pPr marL="0" lvl="0" indent="0" algn="r" rtl="0">
+              <a:lnSpc>
+                <a:spcPct val="100000"/>
+              </a:lnSpc>
+              <a:spcBef>
+                <a:spcPts val="0"/>
+              </a:spcBef>
+              <a:spcAft>
+                <a:spcPts val="0"/>
+              </a:spcAft>
+              <a:buSzPts val="1000"/>
+              <a:buNone/>
+            </a:pPr>
+            <a:fld id="{00000000-1234-1234-1234-123412341234}" type="slidenum">
+              <a:rPr lang="en-US"/>
+              <a:t>6</a:t>
+            </a:fld>
+            <a:endParaRPr/>
+          </a:p>
+        </p:txBody>
+      </p:sp>
+      <p:sp>
+        <p:nvSpPr>
+          <p:cNvPr id="133" name="Google Shape;133;ge6d407e7a1_0_85"/>
+          <p:cNvSpPr txBox="1"/>
+          <p:nvPr/>
+        </p:nvSpPr>
+        <p:spPr>
+          <a:xfrm>
+            <a:off x="554325" y="873125"/>
+            <a:ext cx="8132400" cy="5447615"/>
+          </a:xfrm>
+          <a:prstGeom prst="rect">
+            <a:avLst/>
+          </a:prstGeom>
+          <a:noFill/>
+          <a:ln>
+            <a:noFill/>
+          </a:ln>
+        </p:spPr>
+        <p:txBody>
+          <a:bodyPr spcFirstLastPara="1" wrap="square" lIns="91425" tIns="91425" rIns="91425" bIns="91425" anchor="t" anchorCtr="0">
+            <a:spAutoFit/>
+          </a:bodyPr>
+          <a:lstStyle/>
+          <a:p>
+            <a:pPr marL="0" lvl="0" indent="0" algn="l" rtl="0">
+              <a:spcBef>
+                <a:spcPts val="0"/>
+              </a:spcBef>
+              <a:spcAft>
+                <a:spcPts val="0"/>
+              </a:spcAft>
+              <a:buClr>
+                <a:schemeClr val="dk1"/>
+              </a:buClr>
+              <a:buSzPts val="1100"/>
+              <a:buFont typeface="Arial"/>
+              <a:buNone/>
+            </a:pPr>
+            <a:r>
+              <a:rPr lang="en-US" sz="1800" dirty="0">
+                <a:solidFill>
+                  <a:schemeClr val="dk1"/>
+                </a:solidFill>
+              </a:rPr>
+              <a:t>To activate the environment in the future, either load mamba:</a:t>
+            </a:r>
+          </a:p>
+          <a:p>
+            <a:pPr marL="0" lvl="0" indent="0" algn="l" rtl="0">
+              <a:spcBef>
+                <a:spcPts val="0"/>
+              </a:spcBef>
+              <a:spcAft>
+                <a:spcPts val="0"/>
+              </a:spcAft>
+              <a:buClr>
+                <a:schemeClr val="dk1"/>
+              </a:buClr>
+              <a:buSzPts val="1100"/>
+              <a:buFont typeface="Arial"/>
+              <a:buNone/>
+            </a:pPr>
+            <a:endParaRPr lang="en-US" sz="1800" dirty="0">
+              <a:solidFill>
+                <a:schemeClr val="dk1"/>
+              </a:solidFill>
+            </a:endParaRPr>
+          </a:p>
+          <a:p>
+            <a:pPr lvl="0" indent="920750" algn="l" rtl="0">
+              <a:spcBef>
+                <a:spcPts val="0"/>
+              </a:spcBef>
+              <a:spcAft>
+                <a:spcPts val="0"/>
+              </a:spcAft>
+              <a:buClr>
+                <a:schemeClr val="dk1"/>
+              </a:buClr>
+              <a:buSzPts val="1100"/>
+              <a:buFont typeface="Arial"/>
+              <a:buNone/>
+            </a:pPr>
+            <a:r>
+              <a:rPr lang="en-US" sz="1800" dirty="0">
+                <a:solidFill>
+                  <a:schemeClr val="dk1"/>
+                </a:solidFill>
+                <a:latin typeface="Consolas"/>
+                <a:cs typeface="Consolas"/>
+              </a:rPr>
+              <a:t>   </a:t>
+            </a:r>
+            <a:r>
+              <a:rPr lang="en-US" sz="1800" dirty="0">
+                <a:solidFill>
+                  <a:schemeClr val="dk1"/>
+                </a:solidFill>
+                <a:highlight>
+                  <a:srgbClr val="C0C0C0"/>
+                </a:highlight>
+                <a:latin typeface="Consolas"/>
+                <a:cs typeface="Consolas"/>
+              </a:rPr>
+              <a:t>module load mamba </a:t>
+            </a:r>
+          </a:p>
+          <a:p>
+            <a:pPr lvl="0" indent="920750" algn="l" rtl="0">
+              <a:spcBef>
+                <a:spcPts val="0"/>
+              </a:spcBef>
+              <a:spcAft>
+                <a:spcPts val="0"/>
+              </a:spcAft>
+              <a:buClr>
+                <a:schemeClr val="dk1"/>
+              </a:buClr>
+              <a:buSzPts val="1100"/>
+              <a:buFont typeface="Arial"/>
+              <a:buNone/>
+            </a:pPr>
+            <a:endParaRPr lang="en-US" sz="1800" dirty="0">
+              <a:solidFill>
+                <a:schemeClr val="dk1"/>
+              </a:solidFill>
+              <a:highlight>
+                <a:srgbClr val="C0C0C0"/>
+              </a:highlight>
+              <a:latin typeface="Consolas"/>
+              <a:cs typeface="Consolas"/>
+            </a:endParaRPr>
+          </a:p>
+          <a:p>
+            <a:pPr marL="0" lvl="0" indent="0" algn="l" rtl="0">
+              <a:spcBef>
+                <a:spcPts val="0"/>
+              </a:spcBef>
+              <a:spcAft>
+                <a:spcPts val="0"/>
+              </a:spcAft>
+              <a:buClr>
+                <a:schemeClr val="dk1"/>
+              </a:buClr>
+              <a:buSzPts val="1100"/>
+              <a:buFont typeface="Arial"/>
+              <a:buNone/>
+            </a:pPr>
+            <a:r>
+              <a:rPr lang="en-US" sz="1800" dirty="0">
+                <a:solidFill>
+                  <a:schemeClr val="dk1"/>
+                </a:solidFill>
+              </a:rPr>
+              <a:t>	OR any version of </a:t>
+            </a:r>
+            <a:r>
+              <a:rPr lang="en-US" sz="1800" dirty="0" err="1">
+                <a:solidFill>
+                  <a:schemeClr val="dk1"/>
+                </a:solidFill>
+              </a:rPr>
+              <a:t>conda</a:t>
+            </a:r>
+            <a:r>
+              <a:rPr lang="en-US" sz="1800" dirty="0">
+                <a:solidFill>
+                  <a:schemeClr val="dk1"/>
+                </a:solidFill>
+              </a:rPr>
+              <a:t>:</a:t>
+            </a:r>
+          </a:p>
+          <a:p>
+            <a:pPr marL="0" lvl="0" indent="0" algn="l" rtl="0">
+              <a:spcBef>
+                <a:spcPts val="0"/>
+              </a:spcBef>
+              <a:spcAft>
+                <a:spcPts val="0"/>
+              </a:spcAft>
+              <a:buClr>
+                <a:schemeClr val="dk1"/>
+              </a:buClr>
+              <a:buSzPts val="1100"/>
+              <a:buFont typeface="Arial"/>
+              <a:buNone/>
+            </a:pPr>
+            <a:endParaRPr lang="en-US" sz="1800" dirty="0">
+              <a:solidFill>
+                <a:schemeClr val="dk1"/>
+              </a:solidFill>
+            </a:endParaRPr>
+          </a:p>
+          <a:p>
+            <a:pPr lvl="0" indent="920750" algn="l" rtl="0">
+              <a:spcBef>
+                <a:spcPts val="0"/>
+              </a:spcBef>
+              <a:spcAft>
+                <a:spcPts val="0"/>
+              </a:spcAft>
+              <a:buClr>
+                <a:schemeClr val="dk1"/>
+              </a:buClr>
+              <a:buSzPts val="1100"/>
+              <a:buFont typeface="Arial"/>
+              <a:buNone/>
+            </a:pPr>
+            <a:r>
+              <a:rPr lang="en-US" sz="1800" dirty="0">
+                <a:solidFill>
+                  <a:schemeClr val="dk1"/>
+                </a:solidFill>
+                <a:latin typeface="Consolas"/>
+                <a:cs typeface="Consolas"/>
+              </a:rPr>
+              <a:t>   </a:t>
+            </a:r>
+            <a:r>
+              <a:rPr lang="en-US" sz="1800" dirty="0">
+                <a:solidFill>
+                  <a:schemeClr val="dk1"/>
+                </a:solidFill>
+                <a:highlight>
+                  <a:srgbClr val="C0C0C0"/>
+                </a:highlight>
+                <a:latin typeface="Consolas"/>
+                <a:cs typeface="Consolas"/>
+              </a:rPr>
+              <a:t>module load python-anaconda3/2019.10</a:t>
+            </a:r>
+            <a:endParaRPr lang="en-US" sz="1800" i="1" dirty="0">
+              <a:solidFill>
+                <a:schemeClr val="dk1"/>
+              </a:solidFill>
+            </a:endParaRPr>
+          </a:p>
+          <a:p>
+            <a:pPr marL="0" lvl="0" indent="0" algn="l" rtl="0">
+              <a:spcBef>
+                <a:spcPts val="0"/>
+              </a:spcBef>
+              <a:spcAft>
+                <a:spcPts val="0"/>
+              </a:spcAft>
+              <a:buClr>
+                <a:schemeClr val="dk1"/>
+              </a:buClr>
+              <a:buSzPts val="1100"/>
+              <a:buFont typeface="Arial"/>
+              <a:buNone/>
+            </a:pPr>
+            <a:endParaRPr lang="en-US" sz="1800" dirty="0">
+              <a:solidFill>
+                <a:schemeClr val="dk1"/>
+              </a:solidFill>
+            </a:endParaRPr>
+          </a:p>
+          <a:p>
+            <a:pPr>
+              <a:buClr>
+                <a:schemeClr val="dk1"/>
+              </a:buClr>
+              <a:buSzPts val="1100"/>
+            </a:pPr>
+            <a:r>
+              <a:rPr lang="en-US" sz="1800" dirty="0">
+                <a:solidFill>
+                  <a:schemeClr val="dk1"/>
+                </a:solidFill>
+              </a:rPr>
+              <a:t>	Then run this line to activate the environment:</a:t>
+            </a:r>
+          </a:p>
+          <a:p>
+            <a:pPr marL="0" lvl="0" indent="0" algn="l" rtl="0">
+              <a:spcBef>
+                <a:spcPts val="0"/>
+              </a:spcBef>
+              <a:spcAft>
+                <a:spcPts val="0"/>
+              </a:spcAft>
+              <a:buClr>
+                <a:schemeClr val="dk1"/>
+              </a:buClr>
+              <a:buSzPts val="1100"/>
+              <a:buFont typeface="Arial"/>
+              <a:buNone/>
+            </a:pPr>
+            <a:endParaRPr lang="en-US" sz="1800" dirty="0">
+              <a:solidFill>
+                <a:schemeClr val="dk1"/>
+              </a:solidFill>
+            </a:endParaRPr>
+          </a:p>
+          <a:p>
+            <a:pPr lvl="0" indent="920750" algn="l" rtl="0">
+              <a:spcBef>
+                <a:spcPts val="0"/>
+              </a:spcBef>
+              <a:spcAft>
+                <a:spcPts val="0"/>
+              </a:spcAft>
+              <a:buClr>
+                <a:schemeClr val="dk1"/>
+              </a:buClr>
+              <a:buSzPts val="1100"/>
+              <a:buFont typeface="Arial"/>
+              <a:buNone/>
+            </a:pPr>
+            <a:r>
+              <a:rPr lang="en-US" sz="1700" dirty="0">
+                <a:solidFill>
+                  <a:schemeClr val="dk1"/>
+                </a:solidFill>
+                <a:latin typeface="Consolas"/>
+                <a:ea typeface="Consolas"/>
+                <a:cs typeface="Consolas"/>
+                <a:sym typeface="Consolas"/>
+              </a:rPr>
+              <a:t>   </a:t>
+            </a:r>
+            <a:r>
+              <a:rPr lang="en-US" sz="1800" dirty="0">
+                <a:solidFill>
+                  <a:schemeClr val="dk1"/>
+                </a:solidFill>
+                <a:highlight>
+                  <a:srgbClr val="C0C0C0"/>
+                </a:highlight>
+                <a:latin typeface="Consolas"/>
+                <a:ea typeface="Consolas"/>
+                <a:cs typeface="Consolas"/>
+                <a:sym typeface="Consolas"/>
+              </a:rPr>
+              <a:t>source activate </a:t>
+            </a:r>
+            <a:r>
+              <a:rPr lang="en-US" sz="1800" dirty="0" err="1">
+                <a:solidFill>
+                  <a:schemeClr val="dk1"/>
+                </a:solidFill>
+                <a:highlight>
+                  <a:srgbClr val="C0C0C0"/>
+                </a:highlight>
+                <a:latin typeface="Consolas"/>
+                <a:ea typeface="Consolas"/>
+                <a:cs typeface="Consolas"/>
+                <a:sym typeface="Consolas"/>
+              </a:rPr>
+              <a:t>sample_r_env</a:t>
+            </a:r>
+            <a:endParaRPr lang="en-US" sz="1800" dirty="0">
+              <a:solidFill>
+                <a:schemeClr val="dk1"/>
+              </a:solidFill>
+              <a:highlight>
+                <a:srgbClr val="C0C0C0"/>
+              </a:highlight>
+              <a:latin typeface="Consolas"/>
+              <a:ea typeface="Consolas"/>
+              <a:cs typeface="Consolas"/>
+              <a:sym typeface="Consolas"/>
+            </a:endParaRPr>
+          </a:p>
+          <a:p>
+            <a:pPr marL="0" lvl="0" indent="0" algn="l" rtl="0">
+              <a:spcBef>
+                <a:spcPts val="0"/>
+              </a:spcBef>
+              <a:spcAft>
+                <a:spcPts val="0"/>
+              </a:spcAft>
+              <a:buClr>
+                <a:schemeClr val="dk1"/>
+              </a:buClr>
+              <a:buSzPts val="1100"/>
+              <a:buFont typeface="Arial"/>
+              <a:buNone/>
+            </a:pPr>
+            <a:endParaRPr sz="1800" dirty="0">
+              <a:solidFill>
+                <a:schemeClr val="dk1"/>
+              </a:solidFill>
+              <a:highlight>
+                <a:srgbClr val="CCCCCC"/>
+              </a:highlight>
+              <a:latin typeface="Consolas"/>
+              <a:ea typeface="Consolas"/>
+              <a:cs typeface="Consolas"/>
+              <a:sym typeface="Consolas"/>
+            </a:endParaRPr>
+          </a:p>
+          <a:p>
+            <a:pPr marL="0" lvl="0" indent="0" algn="l" rtl="0">
+              <a:spcBef>
+                <a:spcPts val="0"/>
+              </a:spcBef>
+              <a:spcAft>
+                <a:spcPts val="0"/>
+              </a:spcAft>
+              <a:buClr>
+                <a:schemeClr val="dk1"/>
+              </a:buClr>
+              <a:buSzPts val="1100"/>
+              <a:buFont typeface="Arial"/>
+              <a:buNone/>
+            </a:pPr>
+            <a:r>
+              <a:rPr lang="en-US" sz="1800" dirty="0">
+                <a:solidFill>
+                  <a:schemeClr val="dk1"/>
+                </a:solidFill>
+              </a:rPr>
+              <a:t>To leave the environment:</a:t>
+            </a:r>
+            <a:endParaRPr sz="1800" dirty="0">
+              <a:solidFill>
+                <a:schemeClr val="dk1"/>
+              </a:solidFill>
+            </a:endParaRPr>
+          </a:p>
+          <a:p>
+            <a:pPr marL="0" lvl="0" indent="0" algn="l" rtl="0">
+              <a:spcBef>
+                <a:spcPts val="0"/>
+              </a:spcBef>
+              <a:spcAft>
+                <a:spcPts val="0"/>
+              </a:spcAft>
+              <a:buClr>
+                <a:schemeClr val="dk1"/>
+              </a:buClr>
+              <a:buSzPts val="1100"/>
+              <a:buFont typeface="Arial"/>
+              <a:buNone/>
+            </a:pPr>
+            <a:endParaRPr sz="1800" dirty="0">
+              <a:solidFill>
+                <a:schemeClr val="dk1"/>
+              </a:solidFill>
+            </a:endParaRPr>
+          </a:p>
+          <a:p>
+            <a:pPr lvl="0" indent="920750" algn="l" rtl="0">
+              <a:spcBef>
+                <a:spcPts val="0"/>
+              </a:spcBef>
+              <a:spcAft>
+                <a:spcPts val="0"/>
+              </a:spcAft>
+              <a:buClr>
+                <a:schemeClr val="dk1"/>
+              </a:buClr>
+              <a:buSzPts val="1100"/>
+              <a:buFont typeface="Arial"/>
+              <a:buNone/>
+            </a:pPr>
+            <a:r>
+              <a:rPr lang="en-US" sz="1700" dirty="0">
+                <a:solidFill>
+                  <a:schemeClr val="dk1"/>
+                </a:solidFill>
+                <a:latin typeface="Consolas"/>
+                <a:ea typeface="Consolas"/>
+                <a:cs typeface="Consolas"/>
+                <a:sym typeface="Consolas"/>
+              </a:rPr>
+              <a:t>   </a:t>
+            </a:r>
+            <a:r>
+              <a:rPr lang="en-US" sz="1800" dirty="0">
+                <a:solidFill>
+                  <a:schemeClr val="dk1"/>
+                </a:solidFill>
+                <a:highlight>
+                  <a:srgbClr val="CCCCCC"/>
+                </a:highlight>
+                <a:latin typeface="Consolas"/>
+                <a:ea typeface="Consolas"/>
+                <a:cs typeface="Consolas"/>
+                <a:sym typeface="Consolas"/>
+              </a:rPr>
+              <a:t>source deactivate </a:t>
+            </a:r>
+            <a:r>
+              <a:rPr lang="en-US" sz="1800" dirty="0" err="1">
+                <a:solidFill>
+                  <a:schemeClr val="dk1"/>
+                </a:solidFill>
+                <a:highlight>
+                  <a:srgbClr val="CCCCCC"/>
+                </a:highlight>
+                <a:latin typeface="Consolas"/>
+                <a:ea typeface="Consolas"/>
+                <a:cs typeface="Consolas"/>
+                <a:sym typeface="Consolas"/>
+              </a:rPr>
+              <a:t>sample_r_env</a:t>
+            </a:r>
+            <a:endParaRPr sz="1800" dirty="0">
+              <a:solidFill>
+                <a:schemeClr val="dk1"/>
+              </a:solidFill>
+              <a:highlight>
+                <a:srgbClr val="CCCCCC"/>
+              </a:highlight>
+              <a:latin typeface="Consolas"/>
+              <a:ea typeface="Consolas"/>
+              <a:cs typeface="Consolas"/>
+              <a:sym typeface="Consolas"/>
+            </a:endParaRPr>
+          </a:p>
+          <a:p>
+            <a:pPr marL="0" lvl="0" indent="0" algn="l" rtl="0">
+              <a:spcBef>
+                <a:spcPts val="0"/>
+              </a:spcBef>
+              <a:spcAft>
+                <a:spcPts val="0"/>
+              </a:spcAft>
+              <a:buClr>
+                <a:schemeClr val="dk1"/>
+              </a:buClr>
+              <a:buSzPts val="1100"/>
+              <a:buFont typeface="Arial"/>
+              <a:buNone/>
+            </a:pPr>
+            <a:endParaRPr sz="1800" dirty="0">
+              <a:solidFill>
+                <a:schemeClr val="dk1"/>
+              </a:solidFill>
+              <a:highlight>
+                <a:srgbClr val="CCCCCC"/>
+              </a:highlight>
+              <a:latin typeface="Consolas"/>
+              <a:ea typeface="Consolas"/>
+              <a:cs typeface="Consolas"/>
+              <a:sym typeface="Consolas"/>
+            </a:endParaRPr>
+          </a:p>
+          <a:p>
+            <a:pPr marL="0" lvl="0" indent="0" algn="l" rtl="0">
+              <a:spcBef>
+                <a:spcPts val="0"/>
+              </a:spcBef>
+              <a:spcAft>
+                <a:spcPts val="0"/>
+              </a:spcAft>
+              <a:buClr>
+                <a:schemeClr val="dk1"/>
+              </a:buClr>
+              <a:buSzPts val="1100"/>
+              <a:buFont typeface="Arial"/>
+              <a:buNone/>
+            </a:pPr>
+            <a:r>
+              <a:rPr lang="en-US" sz="1800" dirty="0">
+                <a:solidFill>
+                  <a:schemeClr val="dk1"/>
+                </a:solidFill>
+              </a:rPr>
+              <a:t>To output the </a:t>
+            </a:r>
+            <a:r>
+              <a:rPr lang="en-US" sz="1800" dirty="0" err="1">
+                <a:solidFill>
+                  <a:schemeClr val="dk1"/>
+                </a:solidFill>
+              </a:rPr>
+              <a:t>yaml</a:t>
+            </a:r>
+            <a:r>
+              <a:rPr lang="en-US" sz="1800" dirty="0">
+                <a:solidFill>
+                  <a:schemeClr val="dk1"/>
+                </a:solidFill>
+              </a:rPr>
+              <a:t> file so you can share your environment with others:</a:t>
+            </a:r>
+          </a:p>
+          <a:p>
+            <a:pPr marL="0" lvl="0" indent="0" algn="l" rtl="0">
+              <a:spcBef>
+                <a:spcPts val="0"/>
+              </a:spcBef>
+              <a:spcAft>
+                <a:spcPts val="0"/>
+              </a:spcAft>
+              <a:buClr>
+                <a:schemeClr val="dk1"/>
+              </a:buClr>
+              <a:buSzPts val="1100"/>
+              <a:buFont typeface="Arial"/>
+              <a:buNone/>
+            </a:pPr>
+            <a:endParaRPr lang="en-US" sz="1800" dirty="0">
+              <a:solidFill>
+                <a:schemeClr val="dk1"/>
+              </a:solidFill>
+            </a:endParaRPr>
+          </a:p>
+          <a:p>
+            <a:pPr lvl="0" indent="920750" algn="l" rtl="0">
+              <a:spcBef>
+                <a:spcPts val="0"/>
+              </a:spcBef>
+              <a:spcAft>
+                <a:spcPts val="0"/>
+              </a:spcAft>
+              <a:buClr>
+                <a:schemeClr val="dk1"/>
+              </a:buClr>
+              <a:buSzPts val="1100"/>
+              <a:buFont typeface="Arial"/>
+              <a:buNone/>
+            </a:pPr>
+            <a:r>
+              <a:rPr lang="en-US" sz="1800" dirty="0">
+                <a:solidFill>
+                  <a:schemeClr val="dk1"/>
+                </a:solidFill>
+                <a:ea typeface="Consolas"/>
+              </a:rPr>
+              <a:t>      </a:t>
+            </a:r>
+            <a:r>
+              <a:rPr lang="en-US" sz="1800" dirty="0" err="1">
+                <a:solidFill>
+                  <a:schemeClr val="dk1"/>
+                </a:solidFill>
+                <a:highlight>
+                  <a:srgbClr val="CCCCCC"/>
+                </a:highlight>
+                <a:latin typeface="Consolas"/>
+                <a:ea typeface="Consolas"/>
+                <a:cs typeface="Consolas"/>
+                <a:sym typeface="Consolas"/>
+              </a:rPr>
+              <a:t>conda</a:t>
+            </a:r>
+            <a:r>
+              <a:rPr lang="en-US" sz="1800" dirty="0">
+                <a:solidFill>
+                  <a:schemeClr val="dk1"/>
+                </a:solidFill>
+                <a:highlight>
+                  <a:srgbClr val="CCCCCC"/>
+                </a:highlight>
+                <a:latin typeface="Consolas"/>
+                <a:ea typeface="Consolas"/>
+                <a:cs typeface="Consolas"/>
+                <a:sym typeface="Consolas"/>
+              </a:rPr>
+              <a:t> env export &gt; </a:t>
+            </a:r>
+            <a:r>
+              <a:rPr lang="en-US" sz="1800" dirty="0" err="1">
+                <a:solidFill>
+                  <a:schemeClr val="dk1"/>
+                </a:solidFill>
+                <a:highlight>
+                  <a:srgbClr val="CCCCCC"/>
+                </a:highlight>
+                <a:latin typeface="Consolas"/>
+                <a:ea typeface="Consolas"/>
+                <a:cs typeface="Consolas"/>
+                <a:sym typeface="Consolas"/>
+              </a:rPr>
+              <a:t>sample_r_env.yml</a:t>
+            </a:r>
+            <a:endParaRPr sz="1800" dirty="0">
+              <a:solidFill>
+                <a:schemeClr val="dk1"/>
+              </a:solidFill>
+              <a:highlight>
+                <a:srgbClr val="CCCCCC"/>
+              </a:highlight>
+              <a:latin typeface="Consolas"/>
+              <a:ea typeface="Consolas"/>
+              <a:cs typeface="Consolas"/>
+              <a:sym typeface="Consolas"/>
+            </a:endParaRPr>
+          </a:p>
+        </p:txBody>
+      </p:sp>
+      <p:sp>
+        <p:nvSpPr>
+          <p:cNvPr id="3" name="Google Shape;94;ge58bbe3d21_0_49">
+            <a:extLst>
+              <a:ext uri="{FF2B5EF4-FFF2-40B4-BE49-F238E27FC236}">
+                <a16:creationId xmlns:a16="http://schemas.microsoft.com/office/drawing/2014/main" id="{9133911F-4802-28FD-084F-F3BF4019CC04}"/>
+              </a:ext>
+            </a:extLst>
+          </p:cNvPr>
+          <p:cNvSpPr txBox="1">
+            <a:spLocks noGrp="1"/>
+          </p:cNvSpPr>
+          <p:nvPr>
+            <p:ph type="ftr" idx="11"/>
+          </p:nvPr>
+        </p:nvSpPr>
+        <p:spPr>
+          <a:xfrm>
+            <a:off x="4572000" y="6506896"/>
+            <a:ext cx="4114800" cy="365100"/>
+          </a:xfrm>
+          <a:prstGeom prst="rect">
+            <a:avLst/>
+          </a:prstGeom>
+          <a:noFill/>
+          <a:ln>
+            <a:noFill/>
+          </a:ln>
+        </p:spPr>
+        <p:txBody>
+          <a:bodyPr spcFirstLastPara="1" wrap="square" lIns="91425" tIns="45700" rIns="91425" bIns="45700" anchor="ctr" anchorCtr="0">
+            <a:noAutofit/>
+          </a:bodyPr>
+          <a:lstStyle/>
+          <a:p>
+            <a:pPr marL="0" lvl="0" indent="0" algn="r" rtl="0">
+              <a:lnSpc>
+                <a:spcPct val="100000"/>
+              </a:lnSpc>
+              <a:spcBef>
+                <a:spcPts val="0"/>
+              </a:spcBef>
+              <a:spcAft>
+                <a:spcPts val="0"/>
+              </a:spcAft>
+              <a:buSzPts val="1400"/>
+              <a:buNone/>
+            </a:pPr>
+            <a:r>
+              <a:rPr lang="en-US" dirty="0" err="1"/>
+              <a:t>WRDSl</a:t>
+            </a:r>
+            <a:endParaRPr dirty="0"/>
+          </a:p>
+        </p:txBody>
+      </p:sp>
+    </p:spTree>
+    <p:extLst>
+      <p:ext uri="{BB962C8B-B14F-4D97-AF65-F5344CB8AC3E}">
+        <p14:creationId xmlns:p14="http://schemas.microsoft.com/office/powerpoint/2010/main" val="501469167"/>
+      </p:ext>
+    </p:extLst>
+  </p:cSld>
+  <p:clrMapOvr>
+    <a:masterClrMapping/>
+  </p:clrMapOvr>
+</p:sld>
+</file>
+
+<file path=ppt/slides/slide7.xml><?xml version="1.0" encoding="utf-8"?>
+<p:sld xmlns:a="http://schemas.openxmlformats.org/drawingml/2006/main" xmlns:r="http://schemas.openxmlformats.org/officeDocument/2006/relationships" xmlns:p="http://schemas.openxmlformats.org/presentationml/2006/main">
+  <p:cSld>
+    <p:spTree>
+      <p:nvGrpSpPr>
         <p:cNvPr id="1" name="Shape 249"/>
         <p:cNvGrpSpPr/>
         <p:nvPr/>
@@ -9907,7 +11936,7 @@
 </p:sld>
 </file>
 
-<file path=ppt/slides/slide6.xml><?xml version="1.0" encoding="utf-8"?>
+<file path=ppt/slides/slide8.xml><?xml version="1.0" encoding="utf-8"?>
 <p:sld xmlns:a="http://schemas.openxmlformats.org/drawingml/2006/main" xmlns:r="http://schemas.openxmlformats.org/officeDocument/2006/relationships" xmlns:p="http://schemas.openxmlformats.org/presentationml/2006/main">
   <p:cSld>
     <p:spTree>

</xml_diff>